<commit_message>
Presentazioni: update `Presentazione discussione tesi.pptx`
</commit_message>
<xml_diff>
--- a/Presentazioni/Presentazione discussione tesi.pptx
+++ b/Presentazioni/Presentazione discussione tesi.pptx
@@ -370,7 +370,7 @@
             <a:pPr indent="0" algn="r">
               <a:buNone/>
             </a:pPr>
-            <a:fld id="{5DEF902C-82DD-4D69-B8E6-2C5A729C0FCE}" type="slidenum">
+            <a:fld id="{E2353675-60DD-4090-8B61-4A422B9B60C5}" type="slidenum">
               <a:rPr b="0" lang="it-IT" sz="1400" spc="-1" strike="noStrike">
                 <a:solidFill>
                   <a:srgbClr val="000000"/>
@@ -424,7 +424,7 @@
         <p:spPr>
           <a:xfrm>
             <a:off x="4021200" y="9721800"/>
-            <a:ext cx="3075120" cy="509760"/>
+            <a:ext cx="3074400" cy="509040"/>
           </a:xfrm>
           <a:prstGeom prst="rect">
             <a:avLst/>
@@ -465,7 +465,7 @@
                 <a:tab algn="l" pos="0"/>
               </a:tabLst>
             </a:pPr>
-            <a:fld id="{041F7771-05EF-4036-8930-DA369F71C280}" type="slidenum">
+            <a:fld id="{AF320968-FA72-4683-9667-F7D444769C11}" type="slidenum">
               <a:rPr b="0" lang="it-IT" sz="1300" spc="-1" strike="noStrike">
                 <a:solidFill>
                   <a:schemeClr val="dk1"/>
@@ -496,7 +496,7 @@
         <p:spPr>
           <a:xfrm>
             <a:off x="990720" y="768240"/>
-            <a:ext cx="5116680" cy="3837240"/>
+            <a:ext cx="5115960" cy="3836520"/>
           </a:xfrm>
           <a:prstGeom prst="rect">
             <a:avLst/>
@@ -519,7 +519,7 @@
         <p:spPr>
           <a:xfrm>
             <a:off x="709560" y="4862520"/>
-            <a:ext cx="5678640" cy="4602240"/>
+            <a:ext cx="5677920" cy="4601520"/>
           </a:xfrm>
           <a:prstGeom prst="rect">
             <a:avLst/>
@@ -581,7 +581,7 @@
         <p:spPr>
           <a:xfrm>
             <a:off x="990720" y="768240"/>
-            <a:ext cx="5116680" cy="3837240"/>
+            <a:ext cx="5115960" cy="3836520"/>
           </a:xfrm>
           <a:prstGeom prst="rect">
             <a:avLst/>
@@ -604,7 +604,7 @@
         <p:spPr>
           <a:xfrm>
             <a:off x="709560" y="4862520"/>
-            <a:ext cx="5678640" cy="4602240"/>
+            <a:ext cx="5677920" cy="4601520"/>
           </a:xfrm>
           <a:prstGeom prst="rect">
             <a:avLst/>
@@ -644,7 +644,7 @@
         <p:spPr>
           <a:xfrm>
             <a:off x="4021200" y="9721800"/>
-            <a:ext cx="3075120" cy="509760"/>
+            <a:ext cx="3074400" cy="509040"/>
           </a:xfrm>
           <a:prstGeom prst="rect">
             <a:avLst/>
@@ -686,7 +686,7 @@
                 <a:tab algn="l" pos="0"/>
               </a:tabLst>
             </a:pPr>
-            <a:fld id="{A62FA9A5-AD52-43E7-99FB-21238ACD1C72}" type="slidenum">
+            <a:fld id="{8552CACC-3239-4255-B763-2A5B11156797}" type="slidenum">
               <a:rPr b="0" lang="it-IT" sz="1300" spc="-1" strike="noStrike">
                 <a:solidFill>
                   <a:schemeClr val="dk1"/>
@@ -740,7 +740,7 @@
         <p:spPr>
           <a:xfrm>
             <a:off x="827640" y="-220680"/>
-            <a:ext cx="7343280" cy="1250280"/>
+            <a:ext cx="7342560" cy="1250280"/>
           </a:xfrm>
           <a:prstGeom prst="rect">
             <a:avLst/>
@@ -780,7 +780,7 @@
         <p:spPr>
           <a:xfrm>
             <a:off x="250920" y="981000"/>
-            <a:ext cx="8641080" cy="5759640"/>
+            <a:ext cx="8640360" cy="5758920"/>
           </a:xfrm>
           <a:prstGeom prst="rect">
             <a:avLst/>
@@ -842,7 +842,7 @@
         <p:spPr>
           <a:xfrm>
             <a:off x="827640" y="-220680"/>
-            <a:ext cx="7343280" cy="1250280"/>
+            <a:ext cx="7342560" cy="1250280"/>
           </a:xfrm>
           <a:prstGeom prst="rect">
             <a:avLst/>
@@ -882,7 +882,7 @@
         <p:spPr>
           <a:xfrm>
             <a:off x="250920" y="981000"/>
-            <a:ext cx="4216680" cy="2747160"/>
+            <a:ext cx="4216320" cy="2746800"/>
           </a:xfrm>
           <a:prstGeom prst="rect">
             <a:avLst/>
@@ -924,8 +924,8 @@
         </p:nvSpPr>
         <p:spPr>
           <a:xfrm>
-            <a:off x="4678920" y="981000"/>
-            <a:ext cx="4216680" cy="2747160"/>
+            <a:off x="4678560" y="981000"/>
+            <a:ext cx="4216320" cy="2746800"/>
           </a:xfrm>
           <a:prstGeom prst="rect">
             <a:avLst/>
@@ -967,8 +967,8 @@
         </p:nvSpPr>
         <p:spPr>
           <a:xfrm>
-            <a:off x="250920" y="3989520"/>
-            <a:ext cx="4216680" cy="2747160"/>
+            <a:off x="250920" y="3989160"/>
+            <a:ext cx="4216320" cy="2746800"/>
           </a:xfrm>
           <a:prstGeom prst="rect">
             <a:avLst/>
@@ -1010,8 +1010,8 @@
         </p:nvSpPr>
         <p:spPr>
           <a:xfrm>
-            <a:off x="4678920" y="3989520"/>
-            <a:ext cx="4216680" cy="2747160"/>
+            <a:off x="4678560" y="3989160"/>
+            <a:ext cx="4216320" cy="2746800"/>
           </a:xfrm>
           <a:prstGeom prst="rect">
             <a:avLst/>
@@ -1076,7 +1076,7 @@
         <p:spPr>
           <a:xfrm>
             <a:off x="827640" y="-220680"/>
-            <a:ext cx="7343280" cy="1250280"/>
+            <a:ext cx="7342560" cy="1250280"/>
           </a:xfrm>
           <a:prstGeom prst="rect">
             <a:avLst/>
@@ -1116,7 +1116,7 @@
         <p:spPr>
           <a:xfrm>
             <a:off x="250920" y="981000"/>
-            <a:ext cx="8641080" cy="5759640"/>
+            <a:ext cx="8640360" cy="5758920"/>
           </a:xfrm>
           <a:prstGeom prst="rect">
             <a:avLst/>
@@ -1203,7 +1203,7 @@
         <p:spPr>
           <a:xfrm>
             <a:off x="827640" y="-220680"/>
-            <a:ext cx="7343280" cy="1250280"/>
+            <a:ext cx="7342560" cy="1250280"/>
           </a:xfrm>
           <a:prstGeom prst="rect">
             <a:avLst/>
@@ -1243,7 +1243,7 @@
         <p:spPr>
           <a:xfrm>
             <a:off x="250920" y="981000"/>
-            <a:ext cx="4216680" cy="5759640"/>
+            <a:ext cx="4216320" cy="5758920"/>
           </a:xfrm>
           <a:prstGeom prst="rect">
             <a:avLst/>
@@ -1285,8 +1285,8 @@
         </p:nvSpPr>
         <p:spPr>
           <a:xfrm>
-            <a:off x="4678920" y="981000"/>
-            <a:ext cx="4216680" cy="5759640"/>
+            <a:off x="4678560" y="981000"/>
+            <a:ext cx="4216320" cy="5758920"/>
           </a:xfrm>
           <a:prstGeom prst="rect">
             <a:avLst/>
@@ -1373,7 +1373,7 @@
         <p:spPr>
           <a:xfrm>
             <a:off x="827640" y="-220680"/>
-            <a:ext cx="7343280" cy="1250280"/>
+            <a:ext cx="7342560" cy="1250280"/>
           </a:xfrm>
           <a:prstGeom prst="rect">
             <a:avLst/>
@@ -1501,7 +1501,7 @@
         <p:spPr>
           <a:xfrm>
             <a:off x="827640" y="-220680"/>
-            <a:ext cx="7343280" cy="1250280"/>
+            <a:ext cx="7342560" cy="1250280"/>
           </a:xfrm>
           <a:prstGeom prst="rect">
             <a:avLst/>
@@ -1541,7 +1541,7 @@
         <p:spPr>
           <a:xfrm>
             <a:off x="250920" y="981000"/>
-            <a:ext cx="8641080" cy="5759640"/>
+            <a:ext cx="8640360" cy="5758920"/>
           </a:xfrm>
           <a:prstGeom prst="rect">
             <a:avLst/>
@@ -1669,7 +1669,7 @@
         <p:spPr>
           <a:xfrm>
             <a:off x="827640" y="-220680"/>
-            <a:ext cx="7343280" cy="1250280"/>
+            <a:ext cx="7342560" cy="1250280"/>
           </a:xfrm>
           <a:prstGeom prst="rect">
             <a:avLst/>
@@ -1709,7 +1709,7 @@
         <p:spPr>
           <a:xfrm>
             <a:off x="250920" y="981000"/>
-            <a:ext cx="8641080" cy="5759640"/>
+            <a:ext cx="8640360" cy="5758920"/>
           </a:xfrm>
           <a:prstGeom prst="rect">
             <a:avLst/>
@@ -1796,7 +1796,7 @@
         <p:spPr>
           <a:xfrm>
             <a:off x="827640" y="-220680"/>
-            <a:ext cx="7343280" cy="1250280"/>
+            <a:ext cx="7342560" cy="1250280"/>
           </a:xfrm>
           <a:prstGeom prst="rect">
             <a:avLst/>
@@ -1836,7 +1836,7 @@
         <p:spPr>
           <a:xfrm>
             <a:off x="250920" y="981000"/>
-            <a:ext cx="4216680" cy="5759640"/>
+            <a:ext cx="4216320" cy="5758920"/>
           </a:xfrm>
           <a:prstGeom prst="rect">
             <a:avLst/>
@@ -1878,8 +1878,8 @@
         </p:nvSpPr>
         <p:spPr>
           <a:xfrm>
-            <a:off x="4678920" y="981000"/>
-            <a:ext cx="4216680" cy="5759640"/>
+            <a:off x="4678560" y="981000"/>
+            <a:ext cx="4216320" cy="5758920"/>
           </a:xfrm>
           <a:prstGeom prst="rect">
             <a:avLst/>
@@ -1966,7 +1966,7 @@
         <p:spPr>
           <a:xfrm>
             <a:off x="827640" y="-220680"/>
-            <a:ext cx="7343280" cy="1250280"/>
+            <a:ext cx="7342560" cy="1250280"/>
           </a:xfrm>
           <a:prstGeom prst="rect">
             <a:avLst/>
@@ -2116,7 +2116,7 @@
         <p:spPr>
           <a:xfrm>
             <a:off x="827640" y="-220680"/>
-            <a:ext cx="7343280" cy="1250280"/>
+            <a:ext cx="7342560" cy="1250280"/>
           </a:xfrm>
           <a:prstGeom prst="rect">
             <a:avLst/>
@@ -2156,7 +2156,7 @@
         <p:spPr>
           <a:xfrm>
             <a:off x="250920" y="981000"/>
-            <a:ext cx="8641080" cy="2747160"/>
+            <a:ext cx="8640360" cy="2746800"/>
           </a:xfrm>
           <a:prstGeom prst="rect">
             <a:avLst/>
@@ -2198,8 +2198,8 @@
         </p:nvSpPr>
         <p:spPr>
           <a:xfrm>
-            <a:off x="250920" y="3989520"/>
-            <a:ext cx="8641080" cy="2747160"/>
+            <a:off x="250920" y="3989160"/>
+            <a:ext cx="8640360" cy="2746800"/>
           </a:xfrm>
           <a:prstGeom prst="rect">
             <a:avLst/>
@@ -2264,7 +2264,7 @@
         <p:spPr>
           <a:xfrm>
             <a:off x="827640" y="-220680"/>
-            <a:ext cx="7343280" cy="1250280"/>
+            <a:ext cx="7342560" cy="1250280"/>
           </a:xfrm>
           <a:prstGeom prst="rect">
             <a:avLst/>
@@ -2304,7 +2304,7 @@
         <p:spPr>
           <a:xfrm>
             <a:off x="250920" y="981000"/>
-            <a:ext cx="8641080" cy="5759640"/>
+            <a:ext cx="8640360" cy="5758920"/>
           </a:xfrm>
           <a:prstGeom prst="rect">
             <a:avLst/>
@@ -2347,7 +2347,7 @@
         <p:spPr>
           <a:xfrm>
             <a:off x="250920" y="981000"/>
-            <a:ext cx="8641080" cy="5759640"/>
+            <a:ext cx="8640360" cy="5758920"/>
           </a:xfrm>
           <a:prstGeom prst="rect">
             <a:avLst/>
@@ -2412,7 +2412,7 @@
         <p:spPr>
           <a:xfrm>
             <a:off x="827640" y="-220680"/>
-            <a:ext cx="7343280" cy="1250280"/>
+            <a:ext cx="7342560" cy="1250280"/>
           </a:xfrm>
           <a:prstGeom prst="rect">
             <a:avLst/>
@@ -2452,7 +2452,7 @@
         <p:spPr>
           <a:xfrm>
             <a:off x="250920" y="981000"/>
-            <a:ext cx="8641080" cy="5759640"/>
+            <a:ext cx="8640360" cy="5758920"/>
           </a:xfrm>
           <a:prstGeom prst="rect">
             <a:avLst/>
@@ -2495,7 +2495,7 @@
         <p:spPr>
           <a:xfrm>
             <a:off x="250920" y="981000"/>
-            <a:ext cx="8641080" cy="5759640"/>
+            <a:ext cx="8640360" cy="5758920"/>
           </a:xfrm>
           <a:prstGeom prst="rect">
             <a:avLst/>
@@ -2560,7 +2560,7 @@
         <p:spPr>
           <a:xfrm>
             <a:off x="827640" y="-220680"/>
-            <a:ext cx="7343280" cy="1250280"/>
+            <a:ext cx="7342560" cy="1250280"/>
           </a:xfrm>
           <a:prstGeom prst="rect">
             <a:avLst/>
@@ -2600,7 +2600,7 @@
         <p:spPr>
           <a:xfrm>
             <a:off x="250920" y="981000"/>
-            <a:ext cx="8641080" cy="5759640"/>
+            <a:ext cx="8640360" cy="5758920"/>
           </a:xfrm>
           <a:prstGeom prst="rect">
             <a:avLst/>
@@ -2643,7 +2643,7 @@
         <p:spPr>
           <a:xfrm>
             <a:off x="250920" y="981000"/>
-            <a:ext cx="8641080" cy="5759640"/>
+            <a:ext cx="8640360" cy="5758920"/>
           </a:xfrm>
           <a:prstGeom prst="rect">
             <a:avLst/>
@@ -2708,7 +2708,7 @@
         <p:spPr>
           <a:xfrm>
             <a:off x="827640" y="-220680"/>
-            <a:ext cx="7343280" cy="1250280"/>
+            <a:ext cx="7342560" cy="1250280"/>
           </a:xfrm>
           <a:prstGeom prst="rect">
             <a:avLst/>
@@ -2748,7 +2748,7 @@
         <p:spPr>
           <a:xfrm>
             <a:off x="250920" y="981000"/>
-            <a:ext cx="4216680" cy="5759640"/>
+            <a:ext cx="4216320" cy="5758920"/>
           </a:xfrm>
           <a:prstGeom prst="rect">
             <a:avLst/>
@@ -2790,8 +2790,8 @@
         </p:nvSpPr>
         <p:spPr>
           <a:xfrm>
-            <a:off x="4678920" y="981000"/>
-            <a:ext cx="4216680" cy="2747160"/>
+            <a:off x="4678560" y="981000"/>
+            <a:ext cx="4216320" cy="2746800"/>
           </a:xfrm>
           <a:prstGeom prst="rect">
             <a:avLst/>
@@ -2833,8 +2833,8 @@
         </p:nvSpPr>
         <p:spPr>
           <a:xfrm>
-            <a:off x="4678920" y="3989520"/>
-            <a:ext cx="4216680" cy="2747160"/>
+            <a:off x="4678560" y="3989160"/>
+            <a:ext cx="4216320" cy="2746800"/>
           </a:xfrm>
           <a:prstGeom prst="rect">
             <a:avLst/>
@@ -2899,7 +2899,7 @@
         <p:spPr>
           <a:xfrm>
             <a:off x="827640" y="-220680"/>
-            <a:ext cx="7343280" cy="1250280"/>
+            <a:ext cx="7342560" cy="1250280"/>
           </a:xfrm>
           <a:prstGeom prst="rect">
             <a:avLst/>
@@ -2939,7 +2939,7 @@
         <p:spPr>
           <a:xfrm>
             <a:off x="250920" y="981000"/>
-            <a:ext cx="8641080" cy="5759640"/>
+            <a:ext cx="8640360" cy="5758920"/>
           </a:xfrm>
           <a:prstGeom prst="rect">
             <a:avLst/>
@@ -3007,15 +3007,15 @@
         <p:spPr>
           <a:xfrm>
             <a:off x="-36360" y="-27000"/>
-            <a:ext cx="8278920" cy="792360"/>
+            <a:ext cx="8278200" cy="791640"/>
           </a:xfrm>
           <a:custGeom>
             <a:avLst/>
             <a:gdLst>
-              <a:gd name="textAreaLeft" fmla="*/ 0 w 8278920"/>
-              <a:gd name="textAreaRight" fmla="*/ 8280360 w 8278920"/>
-              <a:gd name="textAreaTop" fmla="*/ 0 h 792360"/>
-              <a:gd name="textAreaBottom" fmla="*/ 793800 h 792360"/>
+              <a:gd name="textAreaLeft" fmla="*/ 0 w 8278200"/>
+              <a:gd name="textAreaRight" fmla="*/ 8280360 w 8278200"/>
+              <a:gd name="textAreaTop" fmla="*/ 0 h 791640"/>
+              <a:gd name="textAreaBottom" fmla="*/ 793800 h 791640"/>
             </a:gdLst>
             <a:ahLst/>
             <a:rect l="textAreaLeft" t="textAreaTop" r="textAreaRight" b="textAreaBottom"/>
@@ -3101,9 +3101,9 @@
         <p:grpSpPr>
           <a:xfrm>
             <a:off x="8244000" y="0"/>
-            <a:ext cx="760680" cy="958320"/>
+            <a:ext cx="759960" cy="958320"/>
             <a:chOff x="8244000" y="0"/>
-            <a:chExt cx="760680" cy="958320"/>
+            <a:chExt cx="759960" cy="958320"/>
           </a:xfrm>
         </p:grpSpPr>
         <p:grpSp>
@@ -3115,9 +3115,9 @@
           <p:grpSpPr>
             <a:xfrm>
               <a:off x="8244000" y="0"/>
-              <a:ext cx="760680" cy="912960"/>
+              <a:ext cx="759960" cy="912240"/>
               <a:chOff x="8244000" y="0"/>
-              <a:chExt cx="760680" cy="912960"/>
+              <a:chExt cx="759960" cy="912240"/>
             </a:xfrm>
           </p:grpSpPr>
           <p:pic>
@@ -3133,7 +3133,7 @@
             <p:spPr>
               <a:xfrm>
                 <a:off x="8244000" y="0"/>
-                <a:ext cx="760680" cy="760680"/>
+                <a:ext cx="759960" cy="759960"/>
               </a:xfrm>
               <a:prstGeom prst="rect">
                 <a:avLst/>
@@ -3152,7 +3152,7 @@
             <p:spPr>
               <a:xfrm>
                 <a:off x="8244000" y="762120"/>
-                <a:ext cx="760680" cy="150840"/>
+                <a:ext cx="759960" cy="150120"/>
               </a:xfrm>
               <a:prstGeom prst="rect">
                 <a:avLst/>
@@ -3199,7 +3199,7 @@
           <p:spPr>
             <a:xfrm>
               <a:off x="8246880" y="685800"/>
-              <a:ext cx="751680" cy="272520"/>
+              <a:ext cx="751320" cy="272520"/>
             </a:xfrm>
             <a:prstGeom prst="rect">
               <a:avLst/>
@@ -3262,7 +3262,7 @@
         <p:spPr>
           <a:xfrm>
             <a:off x="0" y="6669000"/>
-            <a:ext cx="9142560" cy="187560"/>
+            <a:ext cx="9141840" cy="186840"/>
           </a:xfrm>
           <a:prstGeom prst="rect">
             <a:avLst/>
@@ -3311,7 +3311,7 @@
         <p:spPr>
           <a:xfrm>
             <a:off x="324000" y="404640"/>
-            <a:ext cx="8494920" cy="2590920"/>
+            <a:ext cx="8494200" cy="2590200"/>
           </a:xfrm>
           <a:prstGeom prst="roundRect">
             <a:avLst>
@@ -3368,7 +3368,7 @@
         <p:spPr>
           <a:xfrm>
             <a:off x="827640" y="-220680"/>
-            <a:ext cx="7343280" cy="1249920"/>
+            <a:ext cx="7342560" cy="1249920"/>
           </a:xfrm>
           <a:prstGeom prst="rect">
             <a:avLst/>
@@ -3457,34 +3457,7 @@
                 </a:solidFill>
                 <a:latin typeface="Arial"/>
               </a:rPr>
-              <a:t>Fai clic per </a:t>
-            </a:r>
-            <a:r>
-              <a:rPr b="0" lang="it-IT" sz="3200" spc="-1" strike="noStrike">
-                <a:solidFill>
-                  <a:srgbClr val="000000"/>
-                </a:solidFill>
-                <a:latin typeface="Arial"/>
-              </a:rPr>
-              <a:t>modificare il formato </a:t>
-            </a:r>
-            <a:r>
-              <a:rPr b="0" lang="it-IT" sz="3200" spc="-1" strike="noStrike">
-                <a:solidFill>
-                  <a:srgbClr val="000000"/>
-                </a:solidFill>
-                <a:latin typeface="Arial"/>
-              </a:rPr>
-              <a:t>del testo della </a:t>
-            </a:r>
-            <a:r>
-              <a:rPr b="0" lang="it-IT" sz="3200" spc="-1" strike="noStrike">
-                <a:solidFill>
-                  <a:srgbClr val="000000"/>
-                </a:solidFill>
-                <a:latin typeface="Arial"/>
-              </a:rPr>
-              <a:t>struttura</a:t>
+              <a:t>Fai clic per modificare il formato del testo della struttura</a:t>
             </a:r>
             <a:endParaRPr b="0" lang="it-IT" sz="3200" spc="-1" strike="noStrike">
               <a:solidFill>
@@ -3512,16 +3485,7 @@
                 </a:solidFill>
                 <a:latin typeface="Arial"/>
               </a:rPr>
-              <a:t>Secondo livello </a:t>
-            </a:r>
-            <a:r>
-              <a:rPr b="0" lang="it-IT" sz="2800" spc="-1" strike="noStrike">
-                <a:solidFill>
-                  <a:srgbClr val="000000"/>
-                </a:solidFill>
-                <a:latin typeface="Arial"/>
-              </a:rPr>
-              <a:t>struttura</a:t>
+              <a:t>Secondo livello struttura</a:t>
             </a:r>
             <a:endParaRPr b="0" lang="it-IT" sz="2800" spc="-1" strike="noStrike">
               <a:solidFill>
@@ -3605,16 +3569,7 @@
                 </a:solidFill>
                 <a:latin typeface="Arial"/>
               </a:rPr>
-              <a:t>Quinto livello </a:t>
-            </a:r>
-            <a:r>
-              <a:rPr b="0" lang="it-IT" sz="2000" spc="-1" strike="noStrike">
-                <a:solidFill>
-                  <a:srgbClr val="000000"/>
-                </a:solidFill>
-                <a:latin typeface="Arial"/>
-              </a:rPr>
-              <a:t>struttura</a:t>
+              <a:t>Quinto livello struttura</a:t>
             </a:r>
             <a:endParaRPr b="0" lang="it-IT" sz="2000" spc="-1" strike="noStrike">
               <a:solidFill>
@@ -3642,16 +3597,7 @@
                 </a:solidFill>
                 <a:latin typeface="Arial"/>
               </a:rPr>
-              <a:t>Sesto livello </a:t>
-            </a:r>
-            <a:r>
-              <a:rPr b="0" lang="it-IT" sz="2000" spc="-1" strike="noStrike">
-                <a:solidFill>
-                  <a:srgbClr val="000000"/>
-                </a:solidFill>
-                <a:latin typeface="Arial"/>
-              </a:rPr>
-              <a:t>struttura</a:t>
+              <a:t>Sesto livello struttura</a:t>
             </a:r>
             <a:endParaRPr b="0" lang="it-IT" sz="2000" spc="-1" strike="noStrike">
               <a:solidFill>
@@ -3679,25 +3625,7 @@
                 </a:solidFill>
                 <a:latin typeface="Arial"/>
               </a:rPr>
-              <a:t>Settimo </a:t>
-            </a:r>
-            <a:r>
-              <a:rPr b="0" lang="it-IT" sz="2000" spc="-1" strike="noStrike">
-                <a:solidFill>
-                  <a:srgbClr val="000000"/>
-                </a:solidFill>
-                <a:latin typeface="Arial"/>
-              </a:rPr>
-              <a:t>livello </a:t>
-            </a:r>
-            <a:r>
-              <a:rPr b="0" lang="it-IT" sz="2000" spc="-1" strike="noStrike">
-                <a:solidFill>
-                  <a:srgbClr val="000000"/>
-                </a:solidFill>
-                <a:latin typeface="Arial"/>
-              </a:rPr>
-              <a:t>struttura</a:t>
+              <a:t>Settimo livello struttura</a:t>
             </a:r>
             <a:endParaRPr b="0" lang="it-IT" sz="2000" spc="-1" strike="noStrike">
               <a:solidFill>
@@ -3750,15 +3678,15 @@
         <p:spPr>
           <a:xfrm>
             <a:off x="-36360" y="-27000"/>
-            <a:ext cx="8278920" cy="792360"/>
+            <a:ext cx="8278200" cy="791640"/>
           </a:xfrm>
           <a:custGeom>
             <a:avLst/>
             <a:gdLst>
-              <a:gd name="textAreaLeft" fmla="*/ 0 w 8278920"/>
-              <a:gd name="textAreaRight" fmla="*/ 8280360 w 8278920"/>
-              <a:gd name="textAreaTop" fmla="*/ 0 h 792360"/>
-              <a:gd name="textAreaBottom" fmla="*/ 793800 h 792360"/>
+              <a:gd name="textAreaLeft" fmla="*/ 0 w 8278200"/>
+              <a:gd name="textAreaRight" fmla="*/ 8280360 w 8278200"/>
+              <a:gd name="textAreaTop" fmla="*/ 0 h 791640"/>
+              <a:gd name="textAreaBottom" fmla="*/ 793800 h 791640"/>
             </a:gdLst>
             <a:ahLst/>
             <a:rect l="textAreaLeft" t="textAreaTop" r="textAreaRight" b="textAreaBottom"/>
@@ -3844,9 +3772,9 @@
         <p:grpSpPr>
           <a:xfrm>
             <a:off x="8244000" y="0"/>
-            <a:ext cx="760680" cy="958320"/>
+            <a:ext cx="759960" cy="958320"/>
             <a:chOff x="8244000" y="0"/>
-            <a:chExt cx="760680" cy="958320"/>
+            <a:chExt cx="759960" cy="958320"/>
           </a:xfrm>
         </p:grpSpPr>
         <p:grpSp>
@@ -3858,9 +3786,9 @@
           <p:grpSpPr>
             <a:xfrm>
               <a:off x="8244000" y="0"/>
-              <a:ext cx="760680" cy="912960"/>
+              <a:ext cx="759960" cy="912240"/>
               <a:chOff x="8244000" y="0"/>
-              <a:chExt cx="760680" cy="912960"/>
+              <a:chExt cx="759960" cy="912240"/>
             </a:xfrm>
           </p:grpSpPr>
           <p:pic>
@@ -3876,7 +3804,7 @@
             <p:spPr>
               <a:xfrm>
                 <a:off x="8244000" y="0"/>
-                <a:ext cx="760680" cy="760680"/>
+                <a:ext cx="759960" cy="759960"/>
               </a:xfrm>
               <a:prstGeom prst="rect">
                 <a:avLst/>
@@ -3895,7 +3823,7 @@
             <p:spPr>
               <a:xfrm>
                 <a:off x="8244000" y="762120"/>
-                <a:ext cx="760680" cy="150840"/>
+                <a:ext cx="759960" cy="150120"/>
               </a:xfrm>
               <a:prstGeom prst="rect">
                 <a:avLst/>
@@ -3942,7 +3870,7 @@
           <p:spPr>
             <a:xfrm>
               <a:off x="8246880" y="685800"/>
-              <a:ext cx="751680" cy="272520"/>
+              <a:ext cx="751320" cy="272520"/>
             </a:xfrm>
             <a:prstGeom prst="rect">
               <a:avLst/>
@@ -4005,7 +3933,7 @@
         <p:spPr>
           <a:xfrm>
             <a:off x="0" y="6669000"/>
-            <a:ext cx="9142560" cy="187560"/>
+            <a:ext cx="9141840" cy="186840"/>
           </a:xfrm>
           <a:prstGeom prst="rect">
             <a:avLst/>
@@ -4054,7 +3982,7 @@
         <p:spPr>
           <a:xfrm>
             <a:off x="17640" y="6624720"/>
-            <a:ext cx="9124920" cy="258840"/>
+            <a:ext cx="9124200" cy="258120"/>
           </a:xfrm>
           <a:prstGeom prst="rect">
             <a:avLst/>
@@ -4152,7 +4080,7 @@
               </a:rPr>
               <a:t>	</a:t>
             </a:r>
-            <a:fld id="{6D6643D9-DA58-4F01-B64F-048B7EC8E93D}" type="slidenum">
+            <a:fld id="{BC71B00D-3A99-41D9-B1BF-25E33F157E39}" type="slidenum">
               <a:rPr b="0" lang="en-US" sz="1100" spc="-1" strike="noStrike">
                 <a:solidFill>
                   <a:schemeClr val="lt1"/>
@@ -4183,7 +4111,7 @@
         <p:spPr>
           <a:xfrm>
             <a:off x="827640" y="-220680"/>
-            <a:ext cx="7343280" cy="1249920"/>
+            <a:ext cx="7342560" cy="1249920"/>
           </a:xfrm>
           <a:prstGeom prst="rect">
             <a:avLst/>
@@ -4232,7 +4160,7 @@
         <p:spPr>
           <a:xfrm>
             <a:off x="250920" y="981000"/>
-            <a:ext cx="4216320" cy="2746800"/>
+            <a:ext cx="4215960" cy="2746800"/>
           </a:xfrm>
           <a:prstGeom prst="rect">
             <a:avLst/>
@@ -4456,8 +4384,8 @@
         </p:nvSpPr>
         <p:spPr>
           <a:xfrm>
-            <a:off x="4678920" y="981000"/>
-            <a:ext cx="4216320" cy="2746800"/>
+            <a:off x="4678560" y="981000"/>
+            <a:ext cx="4215960" cy="2746800"/>
           </a:xfrm>
           <a:prstGeom prst="rect">
             <a:avLst/>
@@ -4682,7 +4610,7 @@
         <p:spPr>
           <a:xfrm>
             <a:off x="250920" y="3989520"/>
-            <a:ext cx="4216320" cy="2746800"/>
+            <a:ext cx="4215960" cy="2746800"/>
           </a:xfrm>
           <a:prstGeom prst="rect">
             <a:avLst/>
@@ -4906,8 +4834,8 @@
         </p:nvSpPr>
         <p:spPr>
           <a:xfrm>
-            <a:off x="4678920" y="3989520"/>
-            <a:ext cx="4216320" cy="2746800"/>
+            <a:off x="4678560" y="3989520"/>
+            <a:ext cx="4215960" cy="2746800"/>
           </a:xfrm>
           <a:prstGeom prst="rect">
             <a:avLst/>
@@ -5161,15 +5089,15 @@
         <p:spPr>
           <a:xfrm>
             <a:off x="-36360" y="-27000"/>
-            <a:ext cx="8278920" cy="792360"/>
+            <a:ext cx="8278200" cy="791640"/>
           </a:xfrm>
           <a:custGeom>
             <a:avLst/>
             <a:gdLst>
-              <a:gd name="textAreaLeft" fmla="*/ 0 w 8278920"/>
-              <a:gd name="textAreaRight" fmla="*/ 8280360 w 8278920"/>
-              <a:gd name="textAreaTop" fmla="*/ 0 h 792360"/>
-              <a:gd name="textAreaBottom" fmla="*/ 793800 h 792360"/>
+              <a:gd name="textAreaLeft" fmla="*/ 0 w 8278200"/>
+              <a:gd name="textAreaRight" fmla="*/ 8280360 w 8278200"/>
+              <a:gd name="textAreaTop" fmla="*/ 0 h 791640"/>
+              <a:gd name="textAreaBottom" fmla="*/ 793800 h 791640"/>
             </a:gdLst>
             <a:ahLst/>
             <a:rect l="textAreaLeft" t="textAreaTop" r="textAreaRight" b="textAreaBottom"/>
@@ -5255,9 +5183,9 @@
         <p:grpSpPr>
           <a:xfrm>
             <a:off x="8244000" y="0"/>
-            <a:ext cx="760680" cy="958320"/>
+            <a:ext cx="759960" cy="958320"/>
             <a:chOff x="8244000" y="0"/>
-            <a:chExt cx="760680" cy="958320"/>
+            <a:chExt cx="759960" cy="958320"/>
           </a:xfrm>
         </p:grpSpPr>
         <p:grpSp>
@@ -5269,9 +5197,9 @@
           <p:grpSpPr>
             <a:xfrm>
               <a:off x="8244000" y="0"/>
-              <a:ext cx="760680" cy="912960"/>
+              <a:ext cx="759960" cy="912240"/>
               <a:chOff x="8244000" y="0"/>
-              <a:chExt cx="760680" cy="912960"/>
+              <a:chExt cx="759960" cy="912240"/>
             </a:xfrm>
           </p:grpSpPr>
           <p:pic>
@@ -5287,7 +5215,7 @@
             <p:spPr>
               <a:xfrm>
                 <a:off x="8244000" y="0"/>
-                <a:ext cx="760680" cy="760680"/>
+                <a:ext cx="759960" cy="759960"/>
               </a:xfrm>
               <a:prstGeom prst="rect">
                 <a:avLst/>
@@ -5306,7 +5234,7 @@
             <p:spPr>
               <a:xfrm>
                 <a:off x="8244000" y="762120"/>
-                <a:ext cx="760680" cy="150840"/>
+                <a:ext cx="759960" cy="150120"/>
               </a:xfrm>
               <a:prstGeom prst="rect">
                 <a:avLst/>
@@ -5353,7 +5281,7 @@
           <p:spPr>
             <a:xfrm>
               <a:off x="8246880" y="685800"/>
-              <a:ext cx="751680" cy="272520"/>
+              <a:ext cx="751320" cy="272520"/>
             </a:xfrm>
             <a:prstGeom prst="rect">
               <a:avLst/>
@@ -5416,7 +5344,7 @@
         <p:spPr>
           <a:xfrm>
             <a:off x="0" y="6669000"/>
-            <a:ext cx="9142560" cy="187560"/>
+            <a:ext cx="9141840" cy="186840"/>
           </a:xfrm>
           <a:prstGeom prst="rect">
             <a:avLst/>
@@ -5465,7 +5393,7 @@
         <p:spPr>
           <a:xfrm>
             <a:off x="0" y="6669000"/>
-            <a:ext cx="9142560" cy="187560"/>
+            <a:ext cx="9141840" cy="186840"/>
           </a:xfrm>
           <a:prstGeom prst="rect">
             <a:avLst/>
@@ -5518,7 +5446,7 @@
         <p:spPr>
           <a:xfrm>
             <a:off x="17640" y="-14400"/>
-            <a:ext cx="789840" cy="806400"/>
+            <a:ext cx="789120" cy="805680"/>
           </a:xfrm>
           <a:prstGeom prst="rect">
             <a:avLst/>
@@ -5537,7 +5465,7 @@
         <p:spPr>
           <a:xfrm>
             <a:off x="8172360" y="0"/>
-            <a:ext cx="952560" cy="952560"/>
+            <a:ext cx="951840" cy="951840"/>
           </a:xfrm>
           <a:prstGeom prst="rect">
             <a:avLst/>
@@ -5593,7 +5521,7 @@
         <p:spPr>
           <a:xfrm>
             <a:off x="827640" y="-220680"/>
-            <a:ext cx="7343280" cy="1249920"/>
+            <a:ext cx="7342560" cy="1249920"/>
           </a:xfrm>
           <a:prstGeom prst="rect">
             <a:avLst/>
@@ -5642,7 +5570,7 @@
         <p:spPr>
           <a:xfrm>
             <a:off x="250920" y="981000"/>
-            <a:ext cx="8641080" cy="5759640"/>
+            <a:ext cx="8640360" cy="5758920"/>
           </a:xfrm>
           <a:prstGeom prst="rect">
             <a:avLst/>
@@ -5896,15 +5824,15 @@
         <p:spPr>
           <a:xfrm>
             <a:off x="-36360" y="-27000"/>
-            <a:ext cx="8278920" cy="792360"/>
+            <a:ext cx="8278200" cy="791640"/>
           </a:xfrm>
           <a:custGeom>
             <a:avLst/>
             <a:gdLst>
-              <a:gd name="textAreaLeft" fmla="*/ 0 w 8278920"/>
-              <a:gd name="textAreaRight" fmla="*/ 8280360 w 8278920"/>
-              <a:gd name="textAreaTop" fmla="*/ 0 h 792360"/>
-              <a:gd name="textAreaBottom" fmla="*/ 793800 h 792360"/>
+              <a:gd name="textAreaLeft" fmla="*/ 0 w 8278200"/>
+              <a:gd name="textAreaRight" fmla="*/ 8280360 w 8278200"/>
+              <a:gd name="textAreaTop" fmla="*/ 0 h 791640"/>
+              <a:gd name="textAreaBottom" fmla="*/ 793800 h 791640"/>
             </a:gdLst>
             <a:ahLst/>
             <a:rect l="textAreaLeft" t="textAreaTop" r="textAreaRight" b="textAreaBottom"/>
@@ -5990,9 +5918,9 @@
         <p:grpSpPr>
           <a:xfrm>
             <a:off x="8244000" y="0"/>
-            <a:ext cx="760680" cy="958320"/>
+            <a:ext cx="759960" cy="958320"/>
             <a:chOff x="8244000" y="0"/>
-            <a:chExt cx="760680" cy="958320"/>
+            <a:chExt cx="759960" cy="958320"/>
           </a:xfrm>
         </p:grpSpPr>
         <p:grpSp>
@@ -6004,9 +5932,9 @@
           <p:grpSpPr>
             <a:xfrm>
               <a:off x="8244000" y="0"/>
-              <a:ext cx="760680" cy="912960"/>
+              <a:ext cx="759960" cy="912240"/>
               <a:chOff x="8244000" y="0"/>
-              <a:chExt cx="760680" cy="912960"/>
+              <a:chExt cx="759960" cy="912240"/>
             </a:xfrm>
           </p:grpSpPr>
           <p:pic>
@@ -6022,7 +5950,7 @@
             <p:spPr>
               <a:xfrm>
                 <a:off x="8244000" y="0"/>
-                <a:ext cx="760680" cy="760680"/>
+                <a:ext cx="759960" cy="759960"/>
               </a:xfrm>
               <a:prstGeom prst="rect">
                 <a:avLst/>
@@ -6041,7 +5969,7 @@
             <p:spPr>
               <a:xfrm>
                 <a:off x="8244000" y="762120"/>
-                <a:ext cx="760680" cy="150840"/>
+                <a:ext cx="759960" cy="150120"/>
               </a:xfrm>
               <a:prstGeom prst="rect">
                 <a:avLst/>
@@ -6088,7 +6016,7 @@
           <p:spPr>
             <a:xfrm>
               <a:off x="8246880" y="685800"/>
-              <a:ext cx="751680" cy="272520"/>
+              <a:ext cx="751320" cy="272520"/>
             </a:xfrm>
             <a:prstGeom prst="rect">
               <a:avLst/>
@@ -6151,7 +6079,7 @@
         <p:spPr>
           <a:xfrm>
             <a:off x="0" y="6669000"/>
-            <a:ext cx="9142560" cy="187560"/>
+            <a:ext cx="9141840" cy="186840"/>
           </a:xfrm>
           <a:prstGeom prst="rect">
             <a:avLst/>
@@ -6200,7 +6128,7 @@
         <p:spPr>
           <a:xfrm>
             <a:off x="17640" y="6624720"/>
-            <a:ext cx="9124920" cy="258840"/>
+            <a:ext cx="9124200" cy="258120"/>
           </a:xfrm>
           <a:prstGeom prst="rect">
             <a:avLst/>
@@ -6298,7 +6226,7 @@
               </a:rPr>
               <a:t>	</a:t>
             </a:r>
-            <a:fld id="{7A2E1463-C2AF-4C47-9FAE-8A18C4DF2A8E}" type="slidenum">
+            <a:fld id="{6149BA81-8F32-44FD-86B5-98C51BC24C53}" type="slidenum">
               <a:rPr b="0" lang="en-US" sz="1100" spc="-1" strike="noStrike">
                 <a:solidFill>
                   <a:schemeClr val="lt1"/>
@@ -6358,15 +6286,15 @@
         <p:spPr>
           <a:xfrm>
             <a:off x="-36360" y="-27000"/>
-            <a:ext cx="8278920" cy="792360"/>
+            <a:ext cx="8278200" cy="791640"/>
           </a:xfrm>
           <a:custGeom>
             <a:avLst/>
             <a:gdLst>
-              <a:gd name="textAreaLeft" fmla="*/ 0 w 8278920"/>
-              <a:gd name="textAreaRight" fmla="*/ 8280360 w 8278920"/>
-              <a:gd name="textAreaTop" fmla="*/ 0 h 792360"/>
-              <a:gd name="textAreaBottom" fmla="*/ 793800 h 792360"/>
+              <a:gd name="textAreaLeft" fmla="*/ 0 w 8278200"/>
+              <a:gd name="textAreaRight" fmla="*/ 8280360 w 8278200"/>
+              <a:gd name="textAreaTop" fmla="*/ 0 h 791640"/>
+              <a:gd name="textAreaBottom" fmla="*/ 793800 h 791640"/>
             </a:gdLst>
             <a:ahLst/>
             <a:rect l="textAreaLeft" t="textAreaTop" r="textAreaRight" b="textAreaBottom"/>
@@ -6452,9 +6380,9 @@
         <p:grpSpPr>
           <a:xfrm>
             <a:off x="8244000" y="0"/>
-            <a:ext cx="760680" cy="958320"/>
+            <a:ext cx="759960" cy="958320"/>
             <a:chOff x="8244000" y="0"/>
-            <a:chExt cx="760680" cy="958320"/>
+            <a:chExt cx="759960" cy="958320"/>
           </a:xfrm>
         </p:grpSpPr>
         <p:grpSp>
@@ -6466,9 +6394,9 @@
           <p:grpSpPr>
             <a:xfrm>
               <a:off x="8244000" y="0"/>
-              <a:ext cx="760680" cy="912960"/>
+              <a:ext cx="759960" cy="912240"/>
               <a:chOff x="8244000" y="0"/>
-              <a:chExt cx="760680" cy="912960"/>
+              <a:chExt cx="759960" cy="912240"/>
             </a:xfrm>
           </p:grpSpPr>
           <p:pic>
@@ -6484,7 +6412,7 @@
             <p:spPr>
               <a:xfrm>
                 <a:off x="8244000" y="0"/>
-                <a:ext cx="760680" cy="760680"/>
+                <a:ext cx="759960" cy="759960"/>
               </a:xfrm>
               <a:prstGeom prst="rect">
                 <a:avLst/>
@@ -6503,7 +6431,7 @@
             <p:spPr>
               <a:xfrm>
                 <a:off x="8244000" y="762120"/>
-                <a:ext cx="760680" cy="150840"/>
+                <a:ext cx="759960" cy="150120"/>
               </a:xfrm>
               <a:prstGeom prst="rect">
                 <a:avLst/>
@@ -6550,7 +6478,7 @@
           <p:spPr>
             <a:xfrm>
               <a:off x="8246880" y="685800"/>
-              <a:ext cx="751680" cy="272520"/>
+              <a:ext cx="751320" cy="272520"/>
             </a:xfrm>
             <a:prstGeom prst="rect">
               <a:avLst/>
@@ -6613,7 +6541,7 @@
         <p:spPr>
           <a:xfrm>
             <a:off x="0" y="6669000"/>
-            <a:ext cx="9142560" cy="187560"/>
+            <a:ext cx="9141840" cy="186840"/>
           </a:xfrm>
           <a:prstGeom prst="rect">
             <a:avLst/>
@@ -6662,7 +6590,7 @@
         <p:spPr>
           <a:xfrm>
             <a:off x="0" y="6669000"/>
-            <a:ext cx="9142560" cy="187560"/>
+            <a:ext cx="9141840" cy="186840"/>
           </a:xfrm>
           <a:prstGeom prst="rect">
             <a:avLst/>
@@ -6715,7 +6643,7 @@
         <p:spPr>
           <a:xfrm>
             <a:off x="8372880" y="5976000"/>
-            <a:ext cx="703800" cy="642240"/>
+            <a:ext cx="703080" cy="641520"/>
           </a:xfrm>
           <a:prstGeom prst="rect">
             <a:avLst/>
@@ -6734,7 +6662,7 @@
         <p:spPr>
           <a:xfrm>
             <a:off x="17640" y="6624720"/>
-            <a:ext cx="9124920" cy="258840"/>
+            <a:ext cx="9124200" cy="258120"/>
           </a:xfrm>
           <a:prstGeom prst="rect">
             <a:avLst/>
@@ -6832,7 +6760,7 @@
               </a:rPr>
               <a:t>	</a:t>
             </a:r>
-            <a:fld id="{D9BC1211-B27B-4EC0-95DB-EF3B5425F492}" type="slidenum">
+            <a:fld id="{A94AD736-047A-4050-A505-A0182F92F31C}" type="slidenum">
               <a:rPr b="0" lang="en-US" sz="1100" spc="-1" strike="noStrike">
                 <a:solidFill>
                   <a:schemeClr val="lt1"/>
@@ -6863,7 +6791,7 @@
         <p:spPr>
           <a:xfrm>
             <a:off x="827640" y="-220680"/>
-            <a:ext cx="7343280" cy="1249920"/>
+            <a:ext cx="7342560" cy="1249920"/>
           </a:xfrm>
           <a:prstGeom prst="rect">
             <a:avLst/>
@@ -6912,7 +6840,7 @@
         <p:spPr>
           <a:xfrm>
             <a:off x="250920" y="981000"/>
-            <a:ext cx="4216320" cy="5759640"/>
+            <a:ext cx="4215960" cy="5758920"/>
           </a:xfrm>
           <a:prstGeom prst="rect">
             <a:avLst/>
@@ -7136,8 +7064,8 @@
         </p:nvSpPr>
         <p:spPr>
           <a:xfrm>
-            <a:off x="4678920" y="981000"/>
-            <a:ext cx="4216320" cy="5759640"/>
+            <a:off x="4678560" y="981000"/>
+            <a:ext cx="4215960" cy="5758920"/>
           </a:xfrm>
           <a:prstGeom prst="rect">
             <a:avLst/>
@@ -7391,15 +7319,15 @@
         <p:spPr>
           <a:xfrm>
             <a:off x="-36360" y="-27000"/>
-            <a:ext cx="8278920" cy="792360"/>
+            <a:ext cx="8278200" cy="791640"/>
           </a:xfrm>
           <a:custGeom>
             <a:avLst/>
             <a:gdLst>
-              <a:gd name="textAreaLeft" fmla="*/ 0 w 8278920"/>
-              <a:gd name="textAreaRight" fmla="*/ 8280360 w 8278920"/>
-              <a:gd name="textAreaTop" fmla="*/ 0 h 792360"/>
-              <a:gd name="textAreaBottom" fmla="*/ 793800 h 792360"/>
+              <a:gd name="textAreaLeft" fmla="*/ 0 w 8278200"/>
+              <a:gd name="textAreaRight" fmla="*/ 8280360 w 8278200"/>
+              <a:gd name="textAreaTop" fmla="*/ 0 h 791640"/>
+              <a:gd name="textAreaBottom" fmla="*/ 793800 h 791640"/>
             </a:gdLst>
             <a:ahLst/>
             <a:rect l="textAreaLeft" t="textAreaTop" r="textAreaRight" b="textAreaBottom"/>
@@ -7485,9 +7413,9 @@
         <p:grpSpPr>
           <a:xfrm>
             <a:off x="8244000" y="0"/>
-            <a:ext cx="760680" cy="958320"/>
+            <a:ext cx="759960" cy="958320"/>
             <a:chOff x="8244000" y="0"/>
-            <a:chExt cx="760680" cy="958320"/>
+            <a:chExt cx="759960" cy="958320"/>
           </a:xfrm>
         </p:grpSpPr>
         <p:grpSp>
@@ -7499,9 +7427,9 @@
           <p:grpSpPr>
             <a:xfrm>
               <a:off x="8244000" y="0"/>
-              <a:ext cx="760680" cy="912960"/>
+              <a:ext cx="759960" cy="912240"/>
               <a:chOff x="8244000" y="0"/>
-              <a:chExt cx="760680" cy="912960"/>
+              <a:chExt cx="759960" cy="912240"/>
             </a:xfrm>
           </p:grpSpPr>
           <p:pic>
@@ -7517,7 +7445,7 @@
             <p:spPr>
               <a:xfrm>
                 <a:off x="8244000" y="0"/>
-                <a:ext cx="760680" cy="760680"/>
+                <a:ext cx="759960" cy="759960"/>
               </a:xfrm>
               <a:prstGeom prst="rect">
                 <a:avLst/>
@@ -7536,7 +7464,7 @@
             <p:spPr>
               <a:xfrm>
                 <a:off x="8244000" y="762120"/>
-                <a:ext cx="760680" cy="150840"/>
+                <a:ext cx="759960" cy="150120"/>
               </a:xfrm>
               <a:prstGeom prst="rect">
                 <a:avLst/>
@@ -7583,7 +7511,7 @@
           <p:spPr>
             <a:xfrm>
               <a:off x="8246880" y="685800"/>
-              <a:ext cx="751680" cy="272520"/>
+              <a:ext cx="751320" cy="272520"/>
             </a:xfrm>
             <a:prstGeom prst="rect">
               <a:avLst/>
@@ -7646,7 +7574,7 @@
         <p:spPr>
           <a:xfrm>
             <a:off x="0" y="6669000"/>
-            <a:ext cx="9142560" cy="187560"/>
+            <a:ext cx="9141840" cy="186840"/>
           </a:xfrm>
           <a:prstGeom prst="rect">
             <a:avLst/>
@@ -7699,7 +7627,7 @@
         <p:spPr>
           <a:xfrm>
             <a:off x="8372880" y="5976000"/>
-            <a:ext cx="703800" cy="642240"/>
+            <a:ext cx="703080" cy="641520"/>
           </a:xfrm>
           <a:prstGeom prst="rect">
             <a:avLst/>
@@ -7718,7 +7646,7 @@
         <p:spPr>
           <a:xfrm>
             <a:off x="17640" y="6624720"/>
-            <a:ext cx="9124920" cy="258840"/>
+            <a:ext cx="9124200" cy="258120"/>
           </a:xfrm>
           <a:prstGeom prst="rect">
             <a:avLst/>
@@ -7816,7 +7744,7 @@
               </a:rPr>
               <a:t>	</a:t>
             </a:r>
-            <a:fld id="{345509AC-8F6B-4E0C-A15A-80E8422B85FA}" type="slidenum">
+            <a:fld id="{7097CBCA-2D33-464A-8573-238485BD3630}" type="slidenum">
               <a:rPr b="0" lang="en-US" sz="1100" spc="-1" strike="noStrike">
                 <a:solidFill>
                   <a:schemeClr val="lt1"/>
@@ -7876,15 +7804,15 @@
         <p:spPr>
           <a:xfrm>
             <a:off x="-36360" y="-27000"/>
-            <a:ext cx="8278920" cy="792360"/>
+            <a:ext cx="8278200" cy="791640"/>
           </a:xfrm>
           <a:custGeom>
             <a:avLst/>
             <a:gdLst>
-              <a:gd name="textAreaLeft" fmla="*/ 0 w 8278920"/>
-              <a:gd name="textAreaRight" fmla="*/ 8280360 w 8278920"/>
-              <a:gd name="textAreaTop" fmla="*/ 0 h 792360"/>
-              <a:gd name="textAreaBottom" fmla="*/ 793800 h 792360"/>
+              <a:gd name="textAreaLeft" fmla="*/ 0 w 8278200"/>
+              <a:gd name="textAreaRight" fmla="*/ 8280360 w 8278200"/>
+              <a:gd name="textAreaTop" fmla="*/ 0 h 791640"/>
+              <a:gd name="textAreaBottom" fmla="*/ 793800 h 791640"/>
             </a:gdLst>
             <a:ahLst/>
             <a:rect l="textAreaLeft" t="textAreaTop" r="textAreaRight" b="textAreaBottom"/>
@@ -7970,9 +7898,9 @@
         <p:grpSpPr>
           <a:xfrm>
             <a:off x="8244000" y="0"/>
-            <a:ext cx="760680" cy="958320"/>
+            <a:ext cx="759960" cy="958320"/>
             <a:chOff x="8244000" y="0"/>
-            <a:chExt cx="760680" cy="958320"/>
+            <a:chExt cx="759960" cy="958320"/>
           </a:xfrm>
         </p:grpSpPr>
         <p:grpSp>
@@ -7984,9 +7912,9 @@
           <p:grpSpPr>
             <a:xfrm>
               <a:off x="8244000" y="0"/>
-              <a:ext cx="760680" cy="912960"/>
+              <a:ext cx="759960" cy="912240"/>
               <a:chOff x="8244000" y="0"/>
-              <a:chExt cx="760680" cy="912960"/>
+              <a:chExt cx="759960" cy="912240"/>
             </a:xfrm>
           </p:grpSpPr>
           <p:pic>
@@ -8002,7 +7930,7 @@
             <p:spPr>
               <a:xfrm>
                 <a:off x="8244000" y="0"/>
-                <a:ext cx="760680" cy="760680"/>
+                <a:ext cx="759960" cy="759960"/>
               </a:xfrm>
               <a:prstGeom prst="rect">
                 <a:avLst/>
@@ -8021,7 +7949,7 @@
             <p:spPr>
               <a:xfrm>
                 <a:off x="8244000" y="762120"/>
-                <a:ext cx="760680" cy="150840"/>
+                <a:ext cx="759960" cy="150120"/>
               </a:xfrm>
               <a:prstGeom prst="rect">
                 <a:avLst/>
@@ -8068,7 +7996,7 @@
           <p:spPr>
             <a:xfrm>
               <a:off x="8246880" y="685800"/>
-              <a:ext cx="751680" cy="272520"/>
+              <a:ext cx="751320" cy="272520"/>
             </a:xfrm>
             <a:prstGeom prst="rect">
               <a:avLst/>
@@ -8131,7 +8059,7 @@
         <p:spPr>
           <a:xfrm>
             <a:off x="0" y="6669000"/>
-            <a:ext cx="9142560" cy="187560"/>
+            <a:ext cx="9141840" cy="186840"/>
           </a:xfrm>
           <a:prstGeom prst="rect">
             <a:avLst/>
@@ -8180,7 +8108,7 @@
         <p:spPr>
           <a:xfrm>
             <a:off x="0" y="6669000"/>
-            <a:ext cx="9142560" cy="187560"/>
+            <a:ext cx="9141840" cy="186840"/>
           </a:xfrm>
           <a:prstGeom prst="rect">
             <a:avLst/>
@@ -8233,7 +8161,7 @@
         <p:spPr>
           <a:xfrm>
             <a:off x="8372880" y="5976000"/>
-            <a:ext cx="703800" cy="642240"/>
+            <a:ext cx="703080" cy="641520"/>
           </a:xfrm>
           <a:prstGeom prst="rect">
             <a:avLst/>
@@ -8256,7 +8184,7 @@
         <p:spPr>
           <a:xfrm>
             <a:off x="8525520" y="6128640"/>
-            <a:ext cx="703800" cy="642240"/>
+            <a:ext cx="703080" cy="641520"/>
           </a:xfrm>
           <a:prstGeom prst="rect">
             <a:avLst/>
@@ -8275,7 +8203,7 @@
         <p:spPr>
           <a:xfrm>
             <a:off x="17640" y="6624720"/>
-            <a:ext cx="9124920" cy="258840"/>
+            <a:ext cx="9124200" cy="258120"/>
           </a:xfrm>
           <a:prstGeom prst="rect">
             <a:avLst/>
@@ -8373,7 +8301,7 @@
               </a:rPr>
               <a:t>	</a:t>
             </a:r>
-            <a:fld id="{25231B77-CC3A-4862-987A-3FB82ED3EBF7}" type="slidenum">
+            <a:fld id="{6E19A8C5-560B-4740-899A-7B3D7C9B39E0}" type="slidenum">
               <a:rPr b="0" lang="en-US" sz="1100" spc="-1" strike="noStrike">
                 <a:solidFill>
                   <a:schemeClr val="lt1"/>
@@ -8404,7 +8332,7 @@
         <p:spPr>
           <a:xfrm>
             <a:off x="827640" y="-220680"/>
-            <a:ext cx="7343280" cy="1249920"/>
+            <a:ext cx="7342560" cy="1249920"/>
           </a:xfrm>
           <a:prstGeom prst="rect">
             <a:avLst/>
@@ -8482,15 +8410,15 @@
         <p:spPr>
           <a:xfrm>
             <a:off x="-36360" y="-27000"/>
-            <a:ext cx="8278920" cy="792360"/>
+            <a:ext cx="8278200" cy="791640"/>
           </a:xfrm>
           <a:custGeom>
             <a:avLst/>
             <a:gdLst>
-              <a:gd name="textAreaLeft" fmla="*/ 0 w 8278920"/>
-              <a:gd name="textAreaRight" fmla="*/ 8280360 w 8278920"/>
-              <a:gd name="textAreaTop" fmla="*/ 0 h 792360"/>
-              <a:gd name="textAreaBottom" fmla="*/ 793800 h 792360"/>
+              <a:gd name="textAreaLeft" fmla="*/ 0 w 8278200"/>
+              <a:gd name="textAreaRight" fmla="*/ 8280360 w 8278200"/>
+              <a:gd name="textAreaTop" fmla="*/ 0 h 791640"/>
+              <a:gd name="textAreaBottom" fmla="*/ 793800 h 791640"/>
             </a:gdLst>
             <a:ahLst/>
             <a:rect l="textAreaLeft" t="textAreaTop" r="textAreaRight" b="textAreaBottom"/>
@@ -8576,9 +8504,9 @@
         <p:grpSpPr>
           <a:xfrm>
             <a:off x="8244000" y="0"/>
-            <a:ext cx="760680" cy="958320"/>
+            <a:ext cx="759960" cy="958320"/>
             <a:chOff x="8244000" y="0"/>
-            <a:chExt cx="760680" cy="958320"/>
+            <a:chExt cx="759960" cy="958320"/>
           </a:xfrm>
         </p:grpSpPr>
         <p:grpSp>
@@ -8590,9 +8518,9 @@
           <p:grpSpPr>
             <a:xfrm>
               <a:off x="8244000" y="0"/>
-              <a:ext cx="760680" cy="912960"/>
+              <a:ext cx="759960" cy="912240"/>
               <a:chOff x="8244000" y="0"/>
-              <a:chExt cx="760680" cy="912960"/>
+              <a:chExt cx="759960" cy="912240"/>
             </a:xfrm>
           </p:grpSpPr>
           <p:pic>
@@ -8608,7 +8536,7 @@
             <p:spPr>
               <a:xfrm>
                 <a:off x="8244000" y="0"/>
-                <a:ext cx="760680" cy="760680"/>
+                <a:ext cx="759960" cy="759960"/>
               </a:xfrm>
               <a:prstGeom prst="rect">
                 <a:avLst/>
@@ -8627,7 +8555,7 @@
             <p:spPr>
               <a:xfrm>
                 <a:off x="8244000" y="762120"/>
-                <a:ext cx="760680" cy="150840"/>
+                <a:ext cx="759960" cy="150120"/>
               </a:xfrm>
               <a:prstGeom prst="rect">
                 <a:avLst/>
@@ -8674,7 +8602,7 @@
           <p:spPr>
             <a:xfrm>
               <a:off x="8246880" y="685800"/>
-              <a:ext cx="751680" cy="272520"/>
+              <a:ext cx="751320" cy="272520"/>
             </a:xfrm>
             <a:prstGeom prst="rect">
               <a:avLst/>
@@ -8737,7 +8665,7 @@
         <p:spPr>
           <a:xfrm>
             <a:off x="0" y="6669000"/>
-            <a:ext cx="9142560" cy="187560"/>
+            <a:ext cx="9141840" cy="186840"/>
           </a:xfrm>
           <a:prstGeom prst="rect">
             <a:avLst/>
@@ -8790,7 +8718,7 @@
         <p:spPr>
           <a:xfrm>
             <a:off x="8372880" y="5976000"/>
-            <a:ext cx="703800" cy="642240"/>
+            <a:ext cx="703080" cy="641520"/>
           </a:xfrm>
           <a:prstGeom prst="rect">
             <a:avLst/>
@@ -8809,7 +8737,7 @@
         <p:spPr>
           <a:xfrm>
             <a:off x="17640" y="6624720"/>
-            <a:ext cx="9124920" cy="258840"/>
+            <a:ext cx="9124200" cy="258120"/>
           </a:xfrm>
           <a:prstGeom prst="rect">
             <a:avLst/>
@@ -8907,7 +8835,7 @@
               </a:rPr>
               <a:t>	</a:t>
             </a:r>
-            <a:fld id="{102007F2-D358-4270-8DD6-83548B2B8BBD}" type="slidenum">
+            <a:fld id="{B31FB4CA-18DA-4FCE-949F-26318C180D8F}" type="slidenum">
               <a:rPr b="0" lang="en-US" sz="1100" spc="-1" strike="noStrike">
                 <a:solidFill>
                   <a:schemeClr val="lt1"/>
@@ -8967,15 +8895,15 @@
         <p:spPr>
           <a:xfrm>
             <a:off x="-36360" y="-27000"/>
-            <a:ext cx="8278920" cy="792360"/>
+            <a:ext cx="8278200" cy="791640"/>
           </a:xfrm>
           <a:custGeom>
             <a:avLst/>
             <a:gdLst>
-              <a:gd name="textAreaLeft" fmla="*/ 0 w 8278920"/>
-              <a:gd name="textAreaRight" fmla="*/ 8280360 w 8278920"/>
-              <a:gd name="textAreaTop" fmla="*/ 0 h 792360"/>
-              <a:gd name="textAreaBottom" fmla="*/ 793800 h 792360"/>
+              <a:gd name="textAreaLeft" fmla="*/ 0 w 8278200"/>
+              <a:gd name="textAreaRight" fmla="*/ 8280360 w 8278200"/>
+              <a:gd name="textAreaTop" fmla="*/ 0 h 791640"/>
+              <a:gd name="textAreaBottom" fmla="*/ 793800 h 791640"/>
             </a:gdLst>
             <a:ahLst/>
             <a:rect l="textAreaLeft" t="textAreaTop" r="textAreaRight" b="textAreaBottom"/>
@@ -9061,9 +8989,9 @@
         <p:grpSpPr>
           <a:xfrm>
             <a:off x="8244000" y="0"/>
-            <a:ext cx="760680" cy="958320"/>
+            <a:ext cx="759960" cy="958320"/>
             <a:chOff x="8244000" y="0"/>
-            <a:chExt cx="760680" cy="958320"/>
+            <a:chExt cx="759960" cy="958320"/>
           </a:xfrm>
         </p:grpSpPr>
         <p:grpSp>
@@ -9075,9 +9003,9 @@
           <p:grpSpPr>
             <a:xfrm>
               <a:off x="8244000" y="0"/>
-              <a:ext cx="760680" cy="912960"/>
+              <a:ext cx="759960" cy="912240"/>
               <a:chOff x="8244000" y="0"/>
-              <a:chExt cx="760680" cy="912960"/>
+              <a:chExt cx="759960" cy="912240"/>
             </a:xfrm>
           </p:grpSpPr>
           <p:pic>
@@ -9093,7 +9021,7 @@
             <p:spPr>
               <a:xfrm>
                 <a:off x="8244000" y="0"/>
-                <a:ext cx="760680" cy="760680"/>
+                <a:ext cx="759960" cy="759960"/>
               </a:xfrm>
               <a:prstGeom prst="rect">
                 <a:avLst/>
@@ -9112,7 +9040,7 @@
             <p:spPr>
               <a:xfrm>
                 <a:off x="8244000" y="762120"/>
-                <a:ext cx="760680" cy="150840"/>
+                <a:ext cx="759960" cy="150120"/>
               </a:xfrm>
               <a:prstGeom prst="rect">
                 <a:avLst/>
@@ -9159,7 +9087,7 @@
           <p:spPr>
             <a:xfrm>
               <a:off x="8246880" y="685800"/>
-              <a:ext cx="751680" cy="272520"/>
+              <a:ext cx="751320" cy="272520"/>
             </a:xfrm>
             <a:prstGeom prst="rect">
               <a:avLst/>
@@ -9222,7 +9150,7 @@
         <p:spPr>
           <a:xfrm>
             <a:off x="0" y="6669000"/>
-            <a:ext cx="9142560" cy="187560"/>
+            <a:ext cx="9141840" cy="186840"/>
           </a:xfrm>
           <a:prstGeom prst="rect">
             <a:avLst/>
@@ -9275,7 +9203,7 @@
         <p:spPr>
           <a:xfrm>
             <a:off x="8372880" y="5976000"/>
-            <a:ext cx="703800" cy="642240"/>
+            <a:ext cx="703080" cy="641520"/>
           </a:xfrm>
           <a:prstGeom prst="rect">
             <a:avLst/>
@@ -9294,7 +9222,7 @@
         <p:spPr>
           <a:xfrm>
             <a:off x="17640" y="6624720"/>
-            <a:ext cx="9124920" cy="258840"/>
+            <a:ext cx="9124200" cy="258120"/>
           </a:xfrm>
           <a:prstGeom prst="rect">
             <a:avLst/>
@@ -9392,7 +9320,7 @@
               </a:rPr>
               <a:t>	</a:t>
             </a:r>
-            <a:fld id="{B850D84C-8D74-4637-8CE5-C7954323B7E4}" type="slidenum">
+            <a:fld id="{94D25345-4545-47B6-A129-13A5B68AD03D}" type="slidenum">
               <a:rPr b="0" lang="en-US" sz="1100" spc="-1" strike="noStrike">
                 <a:solidFill>
                   <a:schemeClr val="lt1"/>
@@ -9452,15 +9380,15 @@
         <p:spPr>
           <a:xfrm>
             <a:off x="-36360" y="-27000"/>
-            <a:ext cx="8278920" cy="792360"/>
+            <a:ext cx="8278200" cy="791640"/>
           </a:xfrm>
           <a:custGeom>
             <a:avLst/>
             <a:gdLst>
-              <a:gd name="textAreaLeft" fmla="*/ 0 w 8278920"/>
-              <a:gd name="textAreaRight" fmla="*/ 8280360 w 8278920"/>
-              <a:gd name="textAreaTop" fmla="*/ 0 h 792360"/>
-              <a:gd name="textAreaBottom" fmla="*/ 793800 h 792360"/>
+              <a:gd name="textAreaLeft" fmla="*/ 0 w 8278200"/>
+              <a:gd name="textAreaRight" fmla="*/ 8280360 w 8278200"/>
+              <a:gd name="textAreaTop" fmla="*/ 0 h 791640"/>
+              <a:gd name="textAreaBottom" fmla="*/ 793800 h 791640"/>
             </a:gdLst>
             <a:ahLst/>
             <a:rect l="textAreaLeft" t="textAreaTop" r="textAreaRight" b="textAreaBottom"/>
@@ -9546,9 +9474,9 @@
         <p:grpSpPr>
           <a:xfrm>
             <a:off x="8244000" y="0"/>
-            <a:ext cx="760680" cy="958320"/>
+            <a:ext cx="759960" cy="958320"/>
             <a:chOff x="8244000" y="0"/>
-            <a:chExt cx="760680" cy="958320"/>
+            <a:chExt cx="759960" cy="958320"/>
           </a:xfrm>
         </p:grpSpPr>
         <p:grpSp>
@@ -9560,9 +9488,9 @@
           <p:grpSpPr>
             <a:xfrm>
               <a:off x="8244000" y="0"/>
-              <a:ext cx="760680" cy="912960"/>
+              <a:ext cx="759960" cy="912240"/>
               <a:chOff x="8244000" y="0"/>
-              <a:chExt cx="760680" cy="912960"/>
+              <a:chExt cx="759960" cy="912240"/>
             </a:xfrm>
           </p:grpSpPr>
           <p:pic>
@@ -9578,7 +9506,7 @@
             <p:spPr>
               <a:xfrm>
                 <a:off x="8244000" y="0"/>
-                <a:ext cx="760680" cy="760680"/>
+                <a:ext cx="759960" cy="759960"/>
               </a:xfrm>
               <a:prstGeom prst="rect">
                 <a:avLst/>
@@ -9597,7 +9525,7 @@
             <p:spPr>
               <a:xfrm>
                 <a:off x="8244000" y="762120"/>
-                <a:ext cx="760680" cy="150840"/>
+                <a:ext cx="759960" cy="150120"/>
               </a:xfrm>
               <a:prstGeom prst="rect">
                 <a:avLst/>
@@ -9644,7 +9572,7 @@
           <p:spPr>
             <a:xfrm>
               <a:off x="8246880" y="685800"/>
-              <a:ext cx="751680" cy="272520"/>
+              <a:ext cx="751320" cy="272520"/>
             </a:xfrm>
             <a:prstGeom prst="rect">
               <a:avLst/>
@@ -9707,7 +9635,7 @@
         <p:spPr>
           <a:xfrm>
             <a:off x="0" y="6669000"/>
-            <a:ext cx="9142560" cy="187560"/>
+            <a:ext cx="9141840" cy="186840"/>
           </a:xfrm>
           <a:prstGeom prst="rect">
             <a:avLst/>
@@ -9760,7 +9688,7 @@
         <p:spPr>
           <a:xfrm>
             <a:off x="8372880" y="5976000"/>
-            <a:ext cx="703800" cy="642240"/>
+            <a:ext cx="703080" cy="641520"/>
           </a:xfrm>
           <a:prstGeom prst="rect">
             <a:avLst/>
@@ -9813,7 +9741,7 @@
         <p:spPr>
           <a:xfrm>
             <a:off x="324000" y="1052640"/>
-            <a:ext cx="8494920" cy="2590920"/>
+            <a:ext cx="8494200" cy="2590200"/>
           </a:xfrm>
           <a:prstGeom prst="roundRect">
             <a:avLst>
@@ -9866,7 +9794,7 @@
         <p:spPr>
           <a:xfrm>
             <a:off x="539640" y="4292640"/>
-            <a:ext cx="8062920" cy="1859040"/>
+            <a:ext cx="8062200" cy="1858320"/>
           </a:xfrm>
           <a:prstGeom prst="roundRect">
             <a:avLst>
@@ -9920,7 +9848,7 @@
         <p:spPr>
           <a:xfrm>
             <a:off x="827640" y="-220680"/>
-            <a:ext cx="7343280" cy="1249920"/>
+            <a:ext cx="7342560" cy="1249920"/>
           </a:xfrm>
           <a:prstGeom prst="rect">
             <a:avLst/>
@@ -9998,15 +9926,15 @@
         <p:spPr>
           <a:xfrm>
             <a:off x="-36360" y="-27000"/>
-            <a:ext cx="8278920" cy="792360"/>
+            <a:ext cx="8278200" cy="791640"/>
           </a:xfrm>
           <a:custGeom>
             <a:avLst/>
             <a:gdLst>
-              <a:gd name="textAreaLeft" fmla="*/ 0 w 8278920"/>
-              <a:gd name="textAreaRight" fmla="*/ 8280360 w 8278920"/>
-              <a:gd name="textAreaTop" fmla="*/ 0 h 792360"/>
-              <a:gd name="textAreaBottom" fmla="*/ 793800 h 792360"/>
+              <a:gd name="textAreaLeft" fmla="*/ 0 w 8278200"/>
+              <a:gd name="textAreaRight" fmla="*/ 8280360 w 8278200"/>
+              <a:gd name="textAreaTop" fmla="*/ 0 h 791640"/>
+              <a:gd name="textAreaBottom" fmla="*/ 793800 h 791640"/>
             </a:gdLst>
             <a:ahLst/>
             <a:rect l="textAreaLeft" t="textAreaTop" r="textAreaRight" b="textAreaBottom"/>
@@ -10092,9 +10020,9 @@
         <p:grpSpPr>
           <a:xfrm>
             <a:off x="8244000" y="0"/>
-            <a:ext cx="760680" cy="958320"/>
+            <a:ext cx="759960" cy="958320"/>
             <a:chOff x="8244000" y="0"/>
-            <a:chExt cx="760680" cy="958320"/>
+            <a:chExt cx="759960" cy="958320"/>
           </a:xfrm>
         </p:grpSpPr>
         <p:grpSp>
@@ -10106,9 +10034,9 @@
           <p:grpSpPr>
             <a:xfrm>
               <a:off x="8244000" y="0"/>
-              <a:ext cx="760680" cy="912960"/>
+              <a:ext cx="759960" cy="912240"/>
               <a:chOff x="8244000" y="0"/>
-              <a:chExt cx="760680" cy="912960"/>
+              <a:chExt cx="759960" cy="912240"/>
             </a:xfrm>
           </p:grpSpPr>
           <p:pic>
@@ -10124,7 +10052,7 @@
             <p:spPr>
               <a:xfrm>
                 <a:off x="8244000" y="0"/>
-                <a:ext cx="760680" cy="760680"/>
+                <a:ext cx="759960" cy="759960"/>
               </a:xfrm>
               <a:prstGeom prst="rect">
                 <a:avLst/>
@@ -10143,7 +10071,7 @@
             <p:spPr>
               <a:xfrm>
                 <a:off x="8244000" y="762120"/>
-                <a:ext cx="760680" cy="150840"/>
+                <a:ext cx="759960" cy="150120"/>
               </a:xfrm>
               <a:prstGeom prst="rect">
                 <a:avLst/>
@@ -10190,7 +10118,7 @@
           <p:spPr>
             <a:xfrm>
               <a:off x="8246880" y="685800"/>
-              <a:ext cx="751680" cy="272520"/>
+              <a:ext cx="751320" cy="272520"/>
             </a:xfrm>
             <a:prstGeom prst="rect">
               <a:avLst/>
@@ -10253,7 +10181,7 @@
         <p:spPr>
           <a:xfrm>
             <a:off x="0" y="6669000"/>
-            <a:ext cx="9142560" cy="187560"/>
+            <a:ext cx="9141840" cy="186840"/>
           </a:xfrm>
           <a:prstGeom prst="rect">
             <a:avLst/>
@@ -10302,7 +10230,7 @@
         <p:spPr>
           <a:xfrm>
             <a:off x="17640" y="6624720"/>
-            <a:ext cx="9124920" cy="258840"/>
+            <a:ext cx="9124200" cy="258120"/>
           </a:xfrm>
           <a:prstGeom prst="rect">
             <a:avLst/>
@@ -10400,7 +10328,7 @@
               </a:rPr>
               <a:t>	</a:t>
             </a:r>
-            <a:fld id="{725B1C95-D73E-4C72-91E7-A178D0430131}" type="slidenum">
+            <a:fld id="{F48D7A76-68C5-48D5-92EC-CC68C7A49D9A}" type="slidenum">
               <a:rPr b="0" lang="en-US" sz="1100" spc="-1" strike="noStrike">
                 <a:solidFill>
                   <a:schemeClr val="lt1"/>
@@ -10533,7 +10461,7 @@
         <p:spPr>
           <a:xfrm>
             <a:off x="827640" y="-220680"/>
-            <a:ext cx="7343280" cy="1249920"/>
+            <a:ext cx="7342560" cy="1249920"/>
           </a:xfrm>
           <a:prstGeom prst="rect">
             <a:avLst/>
@@ -10582,7 +10510,7 @@
         <p:spPr>
           <a:xfrm>
             <a:off x="250920" y="981000"/>
-            <a:ext cx="8641080" cy="5759640"/>
+            <a:ext cx="8640360" cy="5758920"/>
           </a:xfrm>
           <a:prstGeom prst="rect">
             <a:avLst/>
@@ -10875,7 +10803,7 @@
         <p:spPr>
           <a:xfrm>
             <a:off x="827640" y="-220680"/>
-            <a:ext cx="7343280" cy="1249920"/>
+            <a:ext cx="7342560" cy="1249920"/>
           </a:xfrm>
           <a:prstGeom prst="rect">
             <a:avLst/>
@@ -10924,7 +10852,7 @@
         <p:spPr>
           <a:xfrm>
             <a:off x="250920" y="981000"/>
-            <a:ext cx="4216320" cy="5759640"/>
+            <a:ext cx="4215960" cy="5758920"/>
           </a:xfrm>
           <a:prstGeom prst="rect">
             <a:avLst/>
@@ -11148,8 +11076,8 @@
         </p:nvSpPr>
         <p:spPr>
           <a:xfrm>
-            <a:off x="4678920" y="981000"/>
-            <a:ext cx="4216320" cy="5759640"/>
+            <a:off x="4678560" y="981000"/>
+            <a:ext cx="4215960" cy="5758920"/>
           </a:xfrm>
           <a:prstGeom prst="rect">
             <a:avLst/>
@@ -11442,7 +11370,7 @@
         <p:spPr>
           <a:xfrm>
             <a:off x="827640" y="-220680"/>
-            <a:ext cx="7343280" cy="1249920"/>
+            <a:ext cx="7342560" cy="1249920"/>
           </a:xfrm>
           <a:prstGeom prst="rect">
             <a:avLst/>
@@ -11622,15 +11550,15 @@
         <p:spPr>
           <a:xfrm>
             <a:off x="-36360" y="-27000"/>
-            <a:ext cx="8278920" cy="792360"/>
+            <a:ext cx="8278200" cy="791640"/>
           </a:xfrm>
           <a:custGeom>
             <a:avLst/>
             <a:gdLst>
-              <a:gd name="textAreaLeft" fmla="*/ 0 w 8278920"/>
-              <a:gd name="textAreaRight" fmla="*/ 8280360 w 8278920"/>
-              <a:gd name="textAreaTop" fmla="*/ 0 h 792360"/>
-              <a:gd name="textAreaBottom" fmla="*/ 793800 h 792360"/>
+              <a:gd name="textAreaLeft" fmla="*/ 0 w 8278200"/>
+              <a:gd name="textAreaRight" fmla="*/ 8280360 w 8278200"/>
+              <a:gd name="textAreaTop" fmla="*/ 0 h 791640"/>
+              <a:gd name="textAreaBottom" fmla="*/ 793800 h 791640"/>
             </a:gdLst>
             <a:ahLst/>
             <a:rect l="textAreaLeft" t="textAreaTop" r="textAreaRight" b="textAreaBottom"/>
@@ -11716,9 +11644,9 @@
         <p:grpSpPr>
           <a:xfrm>
             <a:off x="8244000" y="0"/>
-            <a:ext cx="760680" cy="958320"/>
+            <a:ext cx="759960" cy="958320"/>
             <a:chOff x="8244000" y="0"/>
-            <a:chExt cx="760680" cy="958320"/>
+            <a:chExt cx="759960" cy="958320"/>
           </a:xfrm>
         </p:grpSpPr>
         <p:grpSp>
@@ -11730,9 +11658,9 @@
           <p:grpSpPr>
             <a:xfrm>
               <a:off x="8244000" y="0"/>
-              <a:ext cx="760680" cy="912960"/>
+              <a:ext cx="759960" cy="912240"/>
               <a:chOff x="8244000" y="0"/>
-              <a:chExt cx="760680" cy="912960"/>
+              <a:chExt cx="759960" cy="912240"/>
             </a:xfrm>
           </p:grpSpPr>
           <p:pic>
@@ -11748,7 +11676,7 @@
             <p:spPr>
               <a:xfrm>
                 <a:off x="8244000" y="0"/>
-                <a:ext cx="760680" cy="760680"/>
+                <a:ext cx="759960" cy="759960"/>
               </a:xfrm>
               <a:prstGeom prst="rect">
                 <a:avLst/>
@@ -11767,7 +11695,7 @@
             <p:spPr>
               <a:xfrm>
                 <a:off x="8244000" y="762120"/>
-                <a:ext cx="760680" cy="150840"/>
+                <a:ext cx="759960" cy="150120"/>
               </a:xfrm>
               <a:prstGeom prst="rect">
                 <a:avLst/>
@@ -11814,7 +11742,7 @@
           <p:spPr>
             <a:xfrm>
               <a:off x="8246880" y="685800"/>
-              <a:ext cx="751680" cy="272520"/>
+              <a:ext cx="751320" cy="272520"/>
             </a:xfrm>
             <a:prstGeom prst="rect">
               <a:avLst/>
@@ -11877,7 +11805,7 @@
         <p:spPr>
           <a:xfrm>
             <a:off x="0" y="6669000"/>
-            <a:ext cx="9142560" cy="187560"/>
+            <a:ext cx="9141840" cy="186840"/>
           </a:xfrm>
           <a:prstGeom prst="rect">
             <a:avLst/>
@@ -11926,7 +11854,7 @@
         <p:spPr>
           <a:xfrm>
             <a:off x="17640" y="6624720"/>
-            <a:ext cx="9124920" cy="258840"/>
+            <a:ext cx="9124200" cy="258120"/>
           </a:xfrm>
           <a:prstGeom prst="rect">
             <a:avLst/>
@@ -12024,7 +11952,7 @@
               </a:rPr>
               <a:t>	</a:t>
             </a:r>
-            <a:fld id="{8578843E-6AF2-4908-A721-6F212581074C}" type="slidenum">
+            <a:fld id="{00D9B014-C16A-4DA2-B89A-2F260E37EAB6}" type="slidenum">
               <a:rPr b="0" lang="en-US" sz="1100" spc="-1" strike="noStrike">
                 <a:solidFill>
                   <a:schemeClr val="lt1"/>
@@ -12084,15 +12012,15 @@
         <p:spPr>
           <a:xfrm>
             <a:off x="-36360" y="-27000"/>
-            <a:ext cx="8278920" cy="792360"/>
+            <a:ext cx="8278200" cy="791640"/>
           </a:xfrm>
           <a:custGeom>
             <a:avLst/>
             <a:gdLst>
-              <a:gd name="textAreaLeft" fmla="*/ 0 w 8278920"/>
-              <a:gd name="textAreaRight" fmla="*/ 8280360 w 8278920"/>
-              <a:gd name="textAreaTop" fmla="*/ 0 h 792360"/>
-              <a:gd name="textAreaBottom" fmla="*/ 793800 h 792360"/>
+              <a:gd name="textAreaLeft" fmla="*/ 0 w 8278200"/>
+              <a:gd name="textAreaRight" fmla="*/ 8280360 w 8278200"/>
+              <a:gd name="textAreaTop" fmla="*/ 0 h 791640"/>
+              <a:gd name="textAreaBottom" fmla="*/ 793800 h 791640"/>
             </a:gdLst>
             <a:ahLst/>
             <a:rect l="textAreaLeft" t="textAreaTop" r="textAreaRight" b="textAreaBottom"/>
@@ -12178,9 +12106,9 @@
         <p:grpSpPr>
           <a:xfrm>
             <a:off x="8244000" y="0"/>
-            <a:ext cx="760680" cy="958320"/>
+            <a:ext cx="759960" cy="958320"/>
             <a:chOff x="8244000" y="0"/>
-            <a:chExt cx="760680" cy="958320"/>
+            <a:chExt cx="759960" cy="958320"/>
           </a:xfrm>
         </p:grpSpPr>
         <p:grpSp>
@@ -12192,9 +12120,9 @@
           <p:grpSpPr>
             <a:xfrm>
               <a:off x="8244000" y="0"/>
-              <a:ext cx="760680" cy="912960"/>
+              <a:ext cx="759960" cy="912240"/>
               <a:chOff x="8244000" y="0"/>
-              <a:chExt cx="760680" cy="912960"/>
+              <a:chExt cx="759960" cy="912240"/>
             </a:xfrm>
           </p:grpSpPr>
           <p:pic>
@@ -12210,7 +12138,7 @@
             <p:spPr>
               <a:xfrm>
                 <a:off x="8244000" y="0"/>
-                <a:ext cx="760680" cy="760680"/>
+                <a:ext cx="759960" cy="759960"/>
               </a:xfrm>
               <a:prstGeom prst="rect">
                 <a:avLst/>
@@ -12229,7 +12157,7 @@
             <p:spPr>
               <a:xfrm>
                 <a:off x="8244000" y="762120"/>
-                <a:ext cx="760680" cy="150840"/>
+                <a:ext cx="759960" cy="150120"/>
               </a:xfrm>
               <a:prstGeom prst="rect">
                 <a:avLst/>
@@ -12276,7 +12204,7 @@
           <p:spPr>
             <a:xfrm>
               <a:off x="8246880" y="685800"/>
-              <a:ext cx="751680" cy="272520"/>
+              <a:ext cx="751320" cy="272520"/>
             </a:xfrm>
             <a:prstGeom prst="rect">
               <a:avLst/>
@@ -12339,7 +12267,7 @@
         <p:spPr>
           <a:xfrm>
             <a:off x="0" y="6669000"/>
-            <a:ext cx="9142560" cy="187560"/>
+            <a:ext cx="9141840" cy="186840"/>
           </a:xfrm>
           <a:prstGeom prst="rect">
             <a:avLst/>
@@ -12392,7 +12320,7 @@
         <p:spPr>
           <a:xfrm>
             <a:off x="827640" y="-220680"/>
-            <a:ext cx="7343280" cy="1249920"/>
+            <a:ext cx="7342560" cy="1249920"/>
           </a:xfrm>
           <a:prstGeom prst="rect">
             <a:avLst/>
@@ -12441,7 +12369,7 @@
         <p:spPr>
           <a:xfrm>
             <a:off x="250920" y="981000"/>
-            <a:ext cx="8641080" cy="2746800"/>
+            <a:ext cx="8640360" cy="2746800"/>
           </a:xfrm>
           <a:prstGeom prst="rect">
             <a:avLst/>
@@ -12666,7 +12594,7 @@
         <p:spPr>
           <a:xfrm>
             <a:off x="250920" y="3989520"/>
-            <a:ext cx="8641080" cy="2746800"/>
+            <a:ext cx="8640360" cy="2746800"/>
           </a:xfrm>
           <a:prstGeom prst="rect">
             <a:avLst/>
@@ -12920,15 +12848,15 @@
         <p:spPr>
           <a:xfrm>
             <a:off x="-36360" y="-27000"/>
-            <a:ext cx="8278920" cy="792360"/>
+            <a:ext cx="8278200" cy="791640"/>
           </a:xfrm>
           <a:custGeom>
             <a:avLst/>
             <a:gdLst>
-              <a:gd name="textAreaLeft" fmla="*/ 0 w 8278920"/>
-              <a:gd name="textAreaRight" fmla="*/ 8280360 w 8278920"/>
-              <a:gd name="textAreaTop" fmla="*/ 0 h 792360"/>
-              <a:gd name="textAreaBottom" fmla="*/ 793800 h 792360"/>
+              <a:gd name="textAreaLeft" fmla="*/ 0 w 8278200"/>
+              <a:gd name="textAreaRight" fmla="*/ 8280360 w 8278200"/>
+              <a:gd name="textAreaTop" fmla="*/ 0 h 791640"/>
+              <a:gd name="textAreaBottom" fmla="*/ 793800 h 791640"/>
             </a:gdLst>
             <a:ahLst/>
             <a:rect l="textAreaLeft" t="textAreaTop" r="textAreaRight" b="textAreaBottom"/>
@@ -13014,9 +12942,9 @@
         <p:grpSpPr>
           <a:xfrm>
             <a:off x="8244000" y="0"/>
-            <a:ext cx="760680" cy="958320"/>
+            <a:ext cx="759960" cy="958320"/>
             <a:chOff x="8244000" y="0"/>
-            <a:chExt cx="760680" cy="958320"/>
+            <a:chExt cx="759960" cy="958320"/>
           </a:xfrm>
         </p:grpSpPr>
         <p:grpSp>
@@ -13028,9 +12956,9 @@
           <p:grpSpPr>
             <a:xfrm>
               <a:off x="8244000" y="0"/>
-              <a:ext cx="760680" cy="912960"/>
+              <a:ext cx="759960" cy="912240"/>
               <a:chOff x="8244000" y="0"/>
-              <a:chExt cx="760680" cy="912960"/>
+              <a:chExt cx="759960" cy="912240"/>
             </a:xfrm>
           </p:grpSpPr>
           <p:pic>
@@ -13046,7 +12974,7 @@
             <p:spPr>
               <a:xfrm>
                 <a:off x="8244000" y="0"/>
-                <a:ext cx="760680" cy="760680"/>
+                <a:ext cx="759960" cy="759960"/>
               </a:xfrm>
               <a:prstGeom prst="rect">
                 <a:avLst/>
@@ -13065,7 +12993,7 @@
             <p:spPr>
               <a:xfrm>
                 <a:off x="8244000" y="762120"/>
-                <a:ext cx="760680" cy="150840"/>
+                <a:ext cx="759960" cy="150120"/>
               </a:xfrm>
               <a:prstGeom prst="rect">
                 <a:avLst/>
@@ -13112,7 +13040,7 @@
           <p:spPr>
             <a:xfrm>
               <a:off x="8246880" y="685800"/>
-              <a:ext cx="751680" cy="272520"/>
+              <a:ext cx="751320" cy="272520"/>
             </a:xfrm>
             <a:prstGeom prst="rect">
               <a:avLst/>
@@ -13175,7 +13103,7 @@
         <p:spPr>
           <a:xfrm>
             <a:off x="0" y="6669000"/>
-            <a:ext cx="9142560" cy="187560"/>
+            <a:ext cx="9141840" cy="186840"/>
           </a:xfrm>
           <a:prstGeom prst="rect">
             <a:avLst/>
@@ -13224,7 +13152,7 @@
         <p:spPr>
           <a:xfrm>
             <a:off x="17640" y="6624720"/>
-            <a:ext cx="9124920" cy="258840"/>
+            <a:ext cx="9124200" cy="258120"/>
           </a:xfrm>
           <a:prstGeom prst="rect">
             <a:avLst/>
@@ -13322,7 +13250,7 @@
               </a:rPr>
               <a:t>	</a:t>
             </a:r>
-            <a:fld id="{24721DAA-8AC4-457E-85EB-7A920C10C668}" type="slidenum">
+            <a:fld id="{F7ECEACA-DB30-4C83-A834-23118F11DD65}" type="slidenum">
               <a:rPr b="0" lang="en-US" sz="1100" spc="-1" strike="noStrike">
                 <a:solidFill>
                   <a:schemeClr val="lt1"/>
@@ -13353,7 +13281,7 @@
         <p:spPr>
           <a:xfrm>
             <a:off x="827640" y="-220680"/>
-            <a:ext cx="7343280" cy="1249920"/>
+            <a:ext cx="7342560" cy="1249920"/>
           </a:xfrm>
           <a:prstGeom prst="rect">
             <a:avLst/>
@@ -13402,7 +13330,7 @@
         <p:spPr>
           <a:xfrm>
             <a:off x="250920" y="981000"/>
-            <a:ext cx="8641080" cy="5759640"/>
+            <a:ext cx="8640360" cy="5758920"/>
           </a:xfrm>
           <a:prstGeom prst="rect">
             <a:avLst/>
@@ -13627,7 +13555,7 @@
         <p:spPr>
           <a:xfrm>
             <a:off x="250920" y="981000"/>
-            <a:ext cx="8641080" cy="5759640"/>
+            <a:ext cx="8640360" cy="5758920"/>
           </a:xfrm>
           <a:prstGeom prst="rect">
             <a:avLst/>
@@ -13881,15 +13809,15 @@
         <p:spPr>
           <a:xfrm>
             <a:off x="-36360" y="-27000"/>
-            <a:ext cx="8278920" cy="792360"/>
+            <a:ext cx="8278200" cy="791640"/>
           </a:xfrm>
           <a:custGeom>
             <a:avLst/>
             <a:gdLst>
-              <a:gd name="textAreaLeft" fmla="*/ 0 w 8278920"/>
-              <a:gd name="textAreaRight" fmla="*/ 8280360 w 8278920"/>
-              <a:gd name="textAreaTop" fmla="*/ 0 h 792360"/>
-              <a:gd name="textAreaBottom" fmla="*/ 793800 h 792360"/>
+              <a:gd name="textAreaLeft" fmla="*/ 0 w 8278200"/>
+              <a:gd name="textAreaRight" fmla="*/ 8280360 w 8278200"/>
+              <a:gd name="textAreaTop" fmla="*/ 0 h 791640"/>
+              <a:gd name="textAreaBottom" fmla="*/ 793800 h 791640"/>
             </a:gdLst>
             <a:ahLst/>
             <a:rect l="textAreaLeft" t="textAreaTop" r="textAreaRight" b="textAreaBottom"/>
@@ -13975,9 +13903,9 @@
         <p:grpSpPr>
           <a:xfrm>
             <a:off x="8244000" y="0"/>
-            <a:ext cx="760680" cy="958320"/>
+            <a:ext cx="759960" cy="958320"/>
             <a:chOff x="8244000" y="0"/>
-            <a:chExt cx="760680" cy="958320"/>
+            <a:chExt cx="759960" cy="958320"/>
           </a:xfrm>
         </p:grpSpPr>
         <p:grpSp>
@@ -13989,9 +13917,9 @@
           <p:grpSpPr>
             <a:xfrm>
               <a:off x="8244000" y="0"/>
-              <a:ext cx="760680" cy="912960"/>
+              <a:ext cx="759960" cy="912240"/>
               <a:chOff x="8244000" y="0"/>
-              <a:chExt cx="760680" cy="912960"/>
+              <a:chExt cx="759960" cy="912240"/>
             </a:xfrm>
           </p:grpSpPr>
           <p:pic>
@@ -14007,7 +13935,7 @@
             <p:spPr>
               <a:xfrm>
                 <a:off x="8244000" y="0"/>
-                <a:ext cx="760680" cy="760680"/>
+                <a:ext cx="759960" cy="759960"/>
               </a:xfrm>
               <a:prstGeom prst="rect">
                 <a:avLst/>
@@ -14026,7 +13954,7 @@
             <p:spPr>
               <a:xfrm>
                 <a:off x="8244000" y="762120"/>
-                <a:ext cx="760680" cy="150840"/>
+                <a:ext cx="759960" cy="150120"/>
               </a:xfrm>
               <a:prstGeom prst="rect">
                 <a:avLst/>
@@ -14073,7 +14001,7 @@
           <p:spPr>
             <a:xfrm>
               <a:off x="8246880" y="685800"/>
-              <a:ext cx="751680" cy="272520"/>
+              <a:ext cx="751320" cy="272520"/>
             </a:xfrm>
             <a:prstGeom prst="rect">
               <a:avLst/>
@@ -14136,7 +14064,7 @@
         <p:spPr>
           <a:xfrm>
             <a:off x="0" y="6669000"/>
-            <a:ext cx="9142560" cy="187560"/>
+            <a:ext cx="9141840" cy="186840"/>
           </a:xfrm>
           <a:prstGeom prst="rect">
             <a:avLst/>
@@ -14185,7 +14113,7 @@
         <p:spPr>
           <a:xfrm>
             <a:off x="17640" y="6624720"/>
-            <a:ext cx="9124920" cy="258840"/>
+            <a:ext cx="9124200" cy="258120"/>
           </a:xfrm>
           <a:prstGeom prst="rect">
             <a:avLst/>
@@ -14283,7 +14211,7 @@
               </a:rPr>
               <a:t>	</a:t>
             </a:r>
-            <a:fld id="{8BF36CF1-69CE-4A08-B3E1-CC7307C1BE55}" type="slidenum">
+            <a:fld id="{3BC690E3-8316-4AEA-A23E-509064E56489}" type="slidenum">
               <a:rPr b="0" lang="en-US" sz="1100" spc="-1" strike="noStrike">
                 <a:solidFill>
                   <a:schemeClr val="lt1"/>
@@ -14314,7 +14242,7 @@
         <p:spPr>
           <a:xfrm>
             <a:off x="827640" y="-220680"/>
-            <a:ext cx="7343280" cy="1249920"/>
+            <a:ext cx="7342560" cy="1249920"/>
           </a:xfrm>
           <a:prstGeom prst="rect">
             <a:avLst/>
@@ -14363,7 +14291,7 @@
         <p:spPr>
           <a:xfrm>
             <a:off x="250920" y="981000"/>
-            <a:ext cx="8641080" cy="5759640"/>
+            <a:ext cx="8640360" cy="5758920"/>
           </a:xfrm>
           <a:prstGeom prst="rect">
             <a:avLst/>
@@ -14588,7 +14516,7 @@
         <p:spPr>
           <a:xfrm>
             <a:off x="250920" y="981000"/>
-            <a:ext cx="8641080" cy="5759640"/>
+            <a:ext cx="8640360" cy="5758920"/>
           </a:xfrm>
           <a:prstGeom prst="rect">
             <a:avLst/>
@@ -14842,15 +14770,15 @@
         <p:spPr>
           <a:xfrm>
             <a:off x="-36360" y="-27000"/>
-            <a:ext cx="8278920" cy="792360"/>
+            <a:ext cx="8278200" cy="791640"/>
           </a:xfrm>
           <a:custGeom>
             <a:avLst/>
             <a:gdLst>
-              <a:gd name="textAreaLeft" fmla="*/ 0 w 8278920"/>
-              <a:gd name="textAreaRight" fmla="*/ 8280360 w 8278920"/>
-              <a:gd name="textAreaTop" fmla="*/ 0 h 792360"/>
-              <a:gd name="textAreaBottom" fmla="*/ 793800 h 792360"/>
+              <a:gd name="textAreaLeft" fmla="*/ 0 w 8278200"/>
+              <a:gd name="textAreaRight" fmla="*/ 8280360 w 8278200"/>
+              <a:gd name="textAreaTop" fmla="*/ 0 h 791640"/>
+              <a:gd name="textAreaBottom" fmla="*/ 793800 h 791640"/>
             </a:gdLst>
             <a:ahLst/>
             <a:rect l="textAreaLeft" t="textAreaTop" r="textAreaRight" b="textAreaBottom"/>
@@ -14936,9 +14864,9 @@
         <p:grpSpPr>
           <a:xfrm>
             <a:off x="8244000" y="0"/>
-            <a:ext cx="760680" cy="958320"/>
+            <a:ext cx="759960" cy="958320"/>
             <a:chOff x="8244000" y="0"/>
-            <a:chExt cx="760680" cy="958320"/>
+            <a:chExt cx="759960" cy="958320"/>
           </a:xfrm>
         </p:grpSpPr>
         <p:grpSp>
@@ -14950,9 +14878,9 @@
           <p:grpSpPr>
             <a:xfrm>
               <a:off x="8244000" y="0"/>
-              <a:ext cx="760680" cy="912960"/>
+              <a:ext cx="759960" cy="912240"/>
               <a:chOff x="8244000" y="0"/>
-              <a:chExt cx="760680" cy="912960"/>
+              <a:chExt cx="759960" cy="912240"/>
             </a:xfrm>
           </p:grpSpPr>
           <p:pic>
@@ -14968,7 +14896,7 @@
             <p:spPr>
               <a:xfrm>
                 <a:off x="8244000" y="0"/>
-                <a:ext cx="760680" cy="760680"/>
+                <a:ext cx="759960" cy="759960"/>
               </a:xfrm>
               <a:prstGeom prst="rect">
                 <a:avLst/>
@@ -14987,7 +14915,7 @@
             <p:spPr>
               <a:xfrm>
                 <a:off x="8244000" y="762120"/>
-                <a:ext cx="760680" cy="150840"/>
+                <a:ext cx="759960" cy="150120"/>
               </a:xfrm>
               <a:prstGeom prst="rect">
                 <a:avLst/>
@@ -15034,7 +14962,7 @@
           <p:spPr>
             <a:xfrm>
               <a:off x="8246880" y="685800"/>
-              <a:ext cx="751680" cy="272520"/>
+              <a:ext cx="751320" cy="272520"/>
             </a:xfrm>
             <a:prstGeom prst="rect">
               <a:avLst/>
@@ -15097,7 +15025,7 @@
         <p:spPr>
           <a:xfrm>
             <a:off x="0" y="6669000"/>
-            <a:ext cx="9142560" cy="187560"/>
+            <a:ext cx="9141840" cy="186840"/>
           </a:xfrm>
           <a:prstGeom prst="rect">
             <a:avLst/>
@@ -15146,7 +15074,7 @@
         <p:spPr>
           <a:xfrm>
             <a:off x="17640" y="6624720"/>
-            <a:ext cx="9124920" cy="258840"/>
+            <a:ext cx="9124200" cy="258120"/>
           </a:xfrm>
           <a:prstGeom prst="rect">
             <a:avLst/>
@@ -15244,7 +15172,7 @@
               </a:rPr>
               <a:t>	</a:t>
             </a:r>
-            <a:fld id="{B1B57F11-5BB5-401B-B417-B3DE938E44B0}" type="slidenum">
+            <a:fld id="{04A520F8-A4A0-48C8-AD25-B494200AF736}" type="slidenum">
               <a:rPr b="0" lang="en-US" sz="1100" spc="-1" strike="noStrike">
                 <a:solidFill>
                   <a:schemeClr val="lt1"/>
@@ -15275,7 +15203,7 @@
         <p:spPr>
           <a:xfrm>
             <a:off x="827640" y="-220680"/>
-            <a:ext cx="7343280" cy="1249920"/>
+            <a:ext cx="7342560" cy="1249920"/>
           </a:xfrm>
           <a:prstGeom prst="rect">
             <a:avLst/>
@@ -15324,7 +15252,7 @@
         <p:spPr>
           <a:xfrm>
             <a:off x="250920" y="981000"/>
-            <a:ext cx="8641080" cy="5759640"/>
+            <a:ext cx="8640360" cy="5758920"/>
           </a:xfrm>
           <a:prstGeom prst="rect">
             <a:avLst/>
@@ -15549,7 +15477,7 @@
         <p:spPr>
           <a:xfrm>
             <a:off x="250920" y="981000"/>
-            <a:ext cx="8641080" cy="5759640"/>
+            <a:ext cx="8640360" cy="5758920"/>
           </a:xfrm>
           <a:prstGeom prst="rect">
             <a:avLst/>
@@ -15803,15 +15731,15 @@
         <p:spPr>
           <a:xfrm>
             <a:off x="-36360" y="-27000"/>
-            <a:ext cx="8278920" cy="792360"/>
+            <a:ext cx="8278200" cy="791640"/>
           </a:xfrm>
           <a:custGeom>
             <a:avLst/>
             <a:gdLst>
-              <a:gd name="textAreaLeft" fmla="*/ 0 w 8278920"/>
-              <a:gd name="textAreaRight" fmla="*/ 8280360 w 8278920"/>
-              <a:gd name="textAreaTop" fmla="*/ 0 h 792360"/>
-              <a:gd name="textAreaBottom" fmla="*/ 793800 h 792360"/>
+              <a:gd name="textAreaLeft" fmla="*/ 0 w 8278200"/>
+              <a:gd name="textAreaRight" fmla="*/ 8280360 w 8278200"/>
+              <a:gd name="textAreaTop" fmla="*/ 0 h 791640"/>
+              <a:gd name="textAreaBottom" fmla="*/ 793800 h 791640"/>
             </a:gdLst>
             <a:ahLst/>
             <a:rect l="textAreaLeft" t="textAreaTop" r="textAreaRight" b="textAreaBottom"/>
@@ -15897,9 +15825,9 @@
         <p:grpSpPr>
           <a:xfrm>
             <a:off x="8244000" y="0"/>
-            <a:ext cx="760680" cy="958320"/>
+            <a:ext cx="759960" cy="958320"/>
             <a:chOff x="8244000" y="0"/>
-            <a:chExt cx="760680" cy="958320"/>
+            <a:chExt cx="759960" cy="958320"/>
           </a:xfrm>
         </p:grpSpPr>
         <p:grpSp>
@@ -15911,9 +15839,9 @@
           <p:grpSpPr>
             <a:xfrm>
               <a:off x="8244000" y="0"/>
-              <a:ext cx="760680" cy="912960"/>
+              <a:ext cx="759960" cy="912240"/>
               <a:chOff x="8244000" y="0"/>
-              <a:chExt cx="760680" cy="912960"/>
+              <a:chExt cx="759960" cy="912240"/>
             </a:xfrm>
           </p:grpSpPr>
           <p:pic>
@@ -15929,7 +15857,7 @@
             <p:spPr>
               <a:xfrm>
                 <a:off x="8244000" y="0"/>
-                <a:ext cx="760680" cy="760680"/>
+                <a:ext cx="759960" cy="759960"/>
               </a:xfrm>
               <a:prstGeom prst="rect">
                 <a:avLst/>
@@ -15948,7 +15876,7 @@
             <p:spPr>
               <a:xfrm>
                 <a:off x="8244000" y="762120"/>
-                <a:ext cx="760680" cy="150840"/>
+                <a:ext cx="759960" cy="150120"/>
               </a:xfrm>
               <a:prstGeom prst="rect">
                 <a:avLst/>
@@ -15995,7 +15923,7 @@
           <p:spPr>
             <a:xfrm>
               <a:off x="8246880" y="685800"/>
-              <a:ext cx="751680" cy="272520"/>
+              <a:ext cx="751320" cy="272520"/>
             </a:xfrm>
             <a:prstGeom prst="rect">
               <a:avLst/>
@@ -16058,7 +15986,7 @@
         <p:spPr>
           <a:xfrm>
             <a:off x="0" y="6669000"/>
-            <a:ext cx="9142560" cy="187560"/>
+            <a:ext cx="9141840" cy="186840"/>
           </a:xfrm>
           <a:prstGeom prst="rect">
             <a:avLst/>
@@ -16107,7 +16035,7 @@
         <p:spPr>
           <a:xfrm>
             <a:off x="17640" y="6624720"/>
-            <a:ext cx="9124920" cy="258840"/>
+            <a:ext cx="9124200" cy="258120"/>
           </a:xfrm>
           <a:prstGeom prst="rect">
             <a:avLst/>
@@ -16205,7 +16133,7 @@
               </a:rPr>
               <a:t>	</a:t>
             </a:r>
-            <a:fld id="{819B4837-1D4E-448C-99DB-A922B11F8271}" type="slidenum">
+            <a:fld id="{9B4B1EA2-209E-459D-801B-F898ECE6E3C8}" type="slidenum">
               <a:rPr b="0" lang="en-US" sz="1100" spc="-1" strike="noStrike">
                 <a:solidFill>
                   <a:schemeClr val="lt1"/>
@@ -16236,7 +16164,7 @@
         <p:spPr>
           <a:xfrm>
             <a:off x="827640" y="-220680"/>
-            <a:ext cx="7343280" cy="1249920"/>
+            <a:ext cx="7342560" cy="1249920"/>
           </a:xfrm>
           <a:prstGeom prst="rect">
             <a:avLst/>
@@ -16285,7 +16213,7 @@
         <p:spPr>
           <a:xfrm>
             <a:off x="250920" y="981000"/>
-            <a:ext cx="4216320" cy="5759640"/>
+            <a:ext cx="4215960" cy="5758920"/>
           </a:xfrm>
           <a:prstGeom prst="rect">
             <a:avLst/>
@@ -16509,8 +16437,8 @@
         </p:nvSpPr>
         <p:spPr>
           <a:xfrm>
-            <a:off x="4678920" y="981000"/>
-            <a:ext cx="4216320" cy="2746800"/>
+            <a:off x="4678560" y="981000"/>
+            <a:ext cx="4215960" cy="2746800"/>
           </a:xfrm>
           <a:prstGeom prst="rect">
             <a:avLst/>
@@ -16734,8 +16662,8 @@
         </p:nvSpPr>
         <p:spPr>
           <a:xfrm>
-            <a:off x="4678920" y="3989520"/>
-            <a:ext cx="4216320" cy="2746800"/>
+            <a:off x="4678560" y="3989520"/>
+            <a:ext cx="4215960" cy="2746800"/>
           </a:xfrm>
           <a:prstGeom prst="rect">
             <a:avLst/>
@@ -16989,15 +16917,15 @@
         <p:spPr>
           <a:xfrm>
             <a:off x="-36360" y="-27000"/>
-            <a:ext cx="8278920" cy="792360"/>
+            <a:ext cx="8278200" cy="791640"/>
           </a:xfrm>
           <a:custGeom>
             <a:avLst/>
             <a:gdLst>
-              <a:gd name="textAreaLeft" fmla="*/ 0 w 8278920"/>
-              <a:gd name="textAreaRight" fmla="*/ 8280360 w 8278920"/>
-              <a:gd name="textAreaTop" fmla="*/ 0 h 792360"/>
-              <a:gd name="textAreaBottom" fmla="*/ 793800 h 792360"/>
+              <a:gd name="textAreaLeft" fmla="*/ 0 w 8278200"/>
+              <a:gd name="textAreaRight" fmla="*/ 8280360 w 8278200"/>
+              <a:gd name="textAreaTop" fmla="*/ 0 h 791640"/>
+              <a:gd name="textAreaBottom" fmla="*/ 793800 h 791640"/>
             </a:gdLst>
             <a:ahLst/>
             <a:rect l="textAreaLeft" t="textAreaTop" r="textAreaRight" b="textAreaBottom"/>
@@ -17083,9 +17011,9 @@
         <p:grpSpPr>
           <a:xfrm>
             <a:off x="8244000" y="0"/>
-            <a:ext cx="760680" cy="958320"/>
+            <a:ext cx="759960" cy="958320"/>
             <a:chOff x="8244000" y="0"/>
-            <a:chExt cx="760680" cy="958320"/>
+            <a:chExt cx="759960" cy="958320"/>
           </a:xfrm>
         </p:grpSpPr>
         <p:grpSp>
@@ -17097,9 +17025,9 @@
           <p:grpSpPr>
             <a:xfrm>
               <a:off x="8244000" y="0"/>
-              <a:ext cx="760680" cy="912960"/>
+              <a:ext cx="759960" cy="912240"/>
               <a:chOff x="8244000" y="0"/>
-              <a:chExt cx="760680" cy="912960"/>
+              <a:chExt cx="759960" cy="912240"/>
             </a:xfrm>
           </p:grpSpPr>
           <p:pic>
@@ -17115,7 +17043,7 @@
             <p:spPr>
               <a:xfrm>
                 <a:off x="8244000" y="0"/>
-                <a:ext cx="760680" cy="760680"/>
+                <a:ext cx="759960" cy="759960"/>
               </a:xfrm>
               <a:prstGeom prst="rect">
                 <a:avLst/>
@@ -17134,7 +17062,7 @@
             <p:spPr>
               <a:xfrm>
                 <a:off x="8244000" y="762120"/>
-                <a:ext cx="760680" cy="150840"/>
+                <a:ext cx="759960" cy="150120"/>
               </a:xfrm>
               <a:prstGeom prst="rect">
                 <a:avLst/>
@@ -17181,7 +17109,7 @@
           <p:spPr>
             <a:xfrm>
               <a:off x="8246880" y="685800"/>
-              <a:ext cx="751680" cy="272520"/>
+              <a:ext cx="751320" cy="272520"/>
             </a:xfrm>
             <a:prstGeom prst="rect">
               <a:avLst/>
@@ -17244,7 +17172,7 @@
         <p:spPr>
           <a:xfrm>
             <a:off x="0" y="6669000"/>
-            <a:ext cx="9142560" cy="187560"/>
+            <a:ext cx="9141840" cy="186840"/>
           </a:xfrm>
           <a:prstGeom prst="rect">
             <a:avLst/>
@@ -17293,7 +17221,7 @@
         <p:spPr>
           <a:xfrm>
             <a:off x="17640" y="6624720"/>
-            <a:ext cx="9124920" cy="258840"/>
+            <a:ext cx="9124200" cy="258120"/>
           </a:xfrm>
           <a:prstGeom prst="rect">
             <a:avLst/>
@@ -17391,7 +17319,7 @@
               </a:rPr>
               <a:t>	</a:t>
             </a:r>
-            <a:fld id="{CF6C5601-B31C-47AF-9872-6A7A62181176}" type="slidenum">
+            <a:fld id="{EC499226-9E87-4A9D-9448-B7AD89DCD729}" type="slidenum">
               <a:rPr b="0" lang="en-US" sz="1100" spc="-1" strike="noStrike">
                 <a:solidFill>
                   <a:schemeClr val="lt1"/>
@@ -17422,7 +17350,7 @@
         <p:spPr>
           <a:xfrm>
             <a:off x="827640" y="-220680"/>
-            <a:ext cx="7343280" cy="1249920"/>
+            <a:ext cx="7342560" cy="1249920"/>
           </a:xfrm>
           <a:prstGeom prst="rect">
             <a:avLst/>
@@ -17471,7 +17399,7 @@
         <p:spPr>
           <a:xfrm>
             <a:off x="250920" y="981000"/>
-            <a:ext cx="8641080" cy="5759640"/>
+            <a:ext cx="8640360" cy="5758920"/>
           </a:xfrm>
           <a:prstGeom prst="rect">
             <a:avLst/>
@@ -17722,7 +17650,7 @@
         <p:spPr>
           <a:xfrm>
             <a:off x="323640" y="404640"/>
-            <a:ext cx="8495640" cy="2605320"/>
+            <a:ext cx="8494920" cy="2604600"/>
           </a:xfrm>
           <a:prstGeom prst="rect">
             <a:avLst/>
@@ -17784,7 +17712,7 @@
         <p:spPr>
           <a:xfrm>
             <a:off x="3611520" y="5445360"/>
-            <a:ext cx="1919520" cy="1019160"/>
+            <a:ext cx="1918800" cy="1018440"/>
           </a:xfrm>
           <a:prstGeom prst="rect">
             <a:avLst/>
@@ -17807,7 +17735,7 @@
         <p:spPr>
           <a:xfrm>
             <a:off x="539640" y="3285000"/>
-            <a:ext cx="8062920" cy="1811160"/>
+            <a:ext cx="8062200" cy="1810440"/>
           </a:xfrm>
           <a:prstGeom prst="rect">
             <a:avLst/>
@@ -18136,7 +18064,7 @@
         <p:spPr>
           <a:xfrm>
             <a:off x="2156040" y="3098520"/>
-            <a:ext cx="4829760" cy="1247760"/>
+            <a:ext cx="4829400" cy="1247760"/>
           </a:xfrm>
           <a:prstGeom prst="rect">
             <a:avLst/>
@@ -18286,7 +18214,7 @@
         <p:spPr>
           <a:xfrm>
             <a:off x="6084000" y="4591440"/>
-            <a:ext cx="2950920" cy="1004400"/>
+            <a:ext cx="2950200" cy="1004400"/>
           </a:xfrm>
           <a:prstGeom prst="rect">
             <a:avLst/>
@@ -18424,7 +18352,7 @@
         <p:spPr>
           <a:xfrm>
             <a:off x="827640" y="44280"/>
-            <a:ext cx="7343280" cy="719280"/>
+            <a:ext cx="7342560" cy="718560"/>
           </a:xfrm>
           <a:prstGeom prst="rect">
             <a:avLst/>
@@ -18479,7 +18407,7 @@
         <p:spPr>
           <a:xfrm>
             <a:off x="250920" y="883440"/>
-            <a:ext cx="5149080" cy="5759640"/>
+            <a:ext cx="5148360" cy="5758920"/>
           </a:xfrm>
           <a:prstGeom prst="rect">
             <a:avLst/>
@@ -18676,7 +18604,7 @@
         <p:spPr>
           <a:xfrm>
             <a:off x="17640" y="6624720"/>
-            <a:ext cx="9124920" cy="258840"/>
+            <a:ext cx="9124200" cy="258120"/>
           </a:xfrm>
           <a:prstGeom prst="rect">
             <a:avLst/>
@@ -18783,7 +18711,7 @@
               </a:rPr>
               <a:t>	</a:t>
             </a:r>
-            <a:fld id="{42ECEF96-DE3C-4C8A-AA97-A2CF015E7009}" type="slidenum">
+            <a:fld id="{5618BE73-E920-4B4B-893B-F10AAE967A51}" type="slidenum">
               <a:rPr b="0" lang="en-US" sz="1100" spc="-1" strike="noStrike">
                 <a:solidFill>
                   <a:schemeClr val="lt1"/>
@@ -18814,7 +18742,7 @@
         <p:spPr>
           <a:xfrm>
             <a:off x="6120000" y="1080000"/>
-            <a:ext cx="2519280" cy="2519280"/>
+            <a:ext cx="2518560" cy="2518560"/>
           </a:xfrm>
           <a:prstGeom prst="rect">
             <a:avLst/>
@@ -18837,7 +18765,7 @@
         <p:spPr>
           <a:xfrm>
             <a:off x="5818680" y="3997080"/>
-            <a:ext cx="3180960" cy="1582560"/>
+            <a:ext cx="3180240" cy="1581840"/>
           </a:xfrm>
           <a:prstGeom prst="rect">
             <a:avLst/>
@@ -18850,13 +18778,13 @@
       <p:sp>
         <p:nvSpPr>
           <p:cNvPr id="249" name=""/>
-          <p:cNvSpPr txBox="1"/>
+          <p:cNvSpPr/>
           <p:nvPr/>
         </p:nvSpPr>
         <p:spPr>
           <a:xfrm>
             <a:off x="5818680" y="5579640"/>
-            <a:ext cx="1980000" cy="602280"/>
+            <a:ext cx="1560960" cy="601560"/>
           </a:xfrm>
           <a:prstGeom prst="rect">
             <a:avLst/>
@@ -18866,11 +18794,22 @@
             <a:noFill/>
           </a:ln>
         </p:spPr>
+        <p:style>
+          <a:lnRef idx="0"/>
+          <a:fillRef idx="0"/>
+          <a:effectRef idx="0"/>
+          <a:fontRef idx="minor"/>
+        </p:style>
         <p:txBody>
           <a:bodyPr lIns="90000" rIns="90000" tIns="45000" bIns="45000" anchor="t">
             <a:noAutofit/>
           </a:bodyPr>
           <a:p>
+            <a:pPr>
+              <a:lnSpc>
+                <a:spcPct val="100000"/>
+              </a:lnSpc>
+            </a:pPr>
             <a:r>
               <a:rPr b="0" lang="it-IT" sz="1050" spc="-1" strike="noStrike">
                 <a:solidFill>
@@ -18888,7 +18827,11 @@
             </a:endParaRPr>
           </a:p>
           <a:p>
-            <a:pPr algn="ctr"/>
+            <a:pPr algn="ctr">
+              <a:lnSpc>
+                <a:spcPct val="100000"/>
+              </a:lnSpc>
+            </a:pPr>
             <a:r>
               <a:rPr b="0" lang="it-IT" sz="1050" spc="-1" strike="noStrike">
                 <a:solidFill>
@@ -18910,13 +18853,13 @@
       <p:sp>
         <p:nvSpPr>
           <p:cNvPr id="250" name=""/>
-          <p:cNvSpPr txBox="1"/>
+          <p:cNvSpPr/>
           <p:nvPr/>
         </p:nvSpPr>
         <p:spPr>
           <a:xfrm>
             <a:off x="7452000" y="5580000"/>
-            <a:ext cx="1980000" cy="602280"/>
+            <a:ext cx="1547640" cy="601560"/>
           </a:xfrm>
           <a:prstGeom prst="rect">
             <a:avLst/>
@@ -18926,11 +18869,22 @@
             <a:noFill/>
           </a:ln>
         </p:spPr>
+        <p:style>
+          <a:lnRef idx="0"/>
+          <a:fillRef idx="0"/>
+          <a:effectRef idx="0"/>
+          <a:fontRef idx="minor"/>
+        </p:style>
         <p:txBody>
           <a:bodyPr lIns="90000" rIns="90000" tIns="45000" bIns="45000" anchor="t">
             <a:noAutofit/>
           </a:bodyPr>
           <a:p>
+            <a:pPr>
+              <a:lnSpc>
+                <a:spcPct val="100000"/>
+              </a:lnSpc>
+            </a:pPr>
             <a:r>
               <a:rPr b="0" lang="it-IT" sz="1050" spc="-1" strike="noStrike">
                 <a:solidFill>
@@ -18948,7 +18902,11 @@
             </a:endParaRPr>
           </a:p>
           <a:p>
-            <a:pPr algn="ctr"/>
+            <a:pPr algn="ctr">
+              <a:lnSpc>
+                <a:spcPct val="100000"/>
+              </a:lnSpc>
+            </a:pPr>
             <a:r>
               <a:rPr b="0" lang="it-IT" sz="1050" spc="-1" strike="noStrike">
                 <a:solidFill>
@@ -19010,7 +18968,7 @@
         <p:spPr>
           <a:xfrm>
             <a:off x="827640" y="44280"/>
-            <a:ext cx="7343280" cy="719280"/>
+            <a:ext cx="7342560" cy="718560"/>
           </a:xfrm>
           <a:prstGeom prst="rect">
             <a:avLst/>
@@ -19065,7 +19023,7 @@
         <p:spPr>
           <a:xfrm>
             <a:off x="71280" y="1052280"/>
-            <a:ext cx="4428360" cy="5759640"/>
+            <a:ext cx="4427640" cy="5758920"/>
           </a:xfrm>
           <a:prstGeom prst="rect">
             <a:avLst/>
@@ -19318,7 +19276,7 @@
         <p:spPr>
           <a:xfrm>
             <a:off x="17640" y="6624720"/>
-            <a:ext cx="9124920" cy="258840"/>
+            <a:ext cx="9124200" cy="258120"/>
           </a:xfrm>
           <a:prstGeom prst="rect">
             <a:avLst/>
@@ -19425,7 +19383,7 @@
               </a:rPr>
               <a:t>	</a:t>
             </a:r>
-            <a:fld id="{32D6E514-F076-4232-89FA-3C9DE20B0E82}" type="slidenum">
+            <a:fld id="{B4207902-1B89-4B2A-AA3C-6297CB536B9A}" type="slidenum">
               <a:rPr b="0" lang="en-US" sz="1100" spc="-1" strike="noStrike">
                 <a:solidFill>
                   <a:schemeClr val="lt1"/>
@@ -19456,7 +19414,7 @@
         <p:spPr>
           <a:xfrm>
             <a:off x="4451400" y="1052280"/>
-            <a:ext cx="4367880" cy="5247360"/>
+            <a:ext cx="4367160" cy="5246640"/>
           </a:xfrm>
           <a:prstGeom prst="rect">
             <a:avLst/>
@@ -19509,7 +19467,7 @@
         <p:spPr>
           <a:xfrm>
             <a:off x="827640" y="44280"/>
-            <a:ext cx="7343280" cy="719280"/>
+            <a:ext cx="7342560" cy="718560"/>
           </a:xfrm>
           <a:prstGeom prst="rect">
             <a:avLst/>
@@ -19564,7 +19522,7 @@
         <p:spPr>
           <a:xfrm>
             <a:off x="250920" y="981000"/>
-            <a:ext cx="5508000" cy="5759640"/>
+            <a:ext cx="5507280" cy="5758920"/>
           </a:xfrm>
           <a:prstGeom prst="rect">
             <a:avLst/>
@@ -19922,7 +19880,7 @@
         <p:spPr>
           <a:xfrm>
             <a:off x="17640" y="6624720"/>
-            <a:ext cx="9124920" cy="258840"/>
+            <a:ext cx="9124200" cy="258120"/>
           </a:xfrm>
           <a:prstGeom prst="rect">
             <a:avLst/>
@@ -20029,7 +19987,7 @@
               </a:rPr>
               <a:t>	</a:t>
             </a:r>
-            <a:fld id="{F3A9DB85-2E20-4685-9A85-9222DFC2F67E}" type="slidenum">
+            <a:fld id="{5590B57C-4E24-4675-A73B-482FDE2AC92B}" type="slidenum">
               <a:rPr b="0" lang="en-US" sz="1100" spc="-1" strike="noStrike">
                 <a:solidFill>
                   <a:schemeClr val="lt1"/>
@@ -20060,7 +20018,7 @@
         <p:spPr>
           <a:xfrm>
             <a:off x="5940000" y="1142280"/>
-            <a:ext cx="2545200" cy="4077720"/>
+            <a:ext cx="2544480" cy="4077000"/>
           </a:xfrm>
           <a:prstGeom prst="rect">
             <a:avLst/>
@@ -20073,13 +20031,13 @@
       <p:sp>
         <p:nvSpPr>
           <p:cNvPr id="259" name=""/>
-          <p:cNvSpPr txBox="1"/>
+          <p:cNvSpPr/>
           <p:nvPr/>
         </p:nvSpPr>
         <p:spPr>
           <a:xfrm>
             <a:off x="5818680" y="5220000"/>
-            <a:ext cx="2821320" cy="720000"/>
+            <a:ext cx="2820600" cy="719280"/>
           </a:xfrm>
           <a:prstGeom prst="rect">
             <a:avLst/>
@@ -20089,12 +20047,22 @@
             <a:noFill/>
           </a:ln>
         </p:spPr>
+        <p:style>
+          <a:lnRef idx="0"/>
+          <a:fillRef idx="0"/>
+          <a:effectRef idx="0"/>
+          <a:fontRef idx="minor"/>
+        </p:style>
         <p:txBody>
           <a:bodyPr lIns="90000" rIns="90000" tIns="45000" bIns="45000" anchor="t">
             <a:noAutofit/>
           </a:bodyPr>
           <a:p>
-            <a:pPr algn="ctr"/>
+            <a:pPr algn="ctr">
+              <a:lnSpc>
+                <a:spcPct val="100000"/>
+              </a:lnSpc>
+            </a:pPr>
             <a:r>
               <a:rPr b="0" lang="it-IT" sz="1200" spc="-1" strike="noStrike">
                 <a:solidFill>
@@ -20112,7 +20080,11 @@
             </a:endParaRPr>
           </a:p>
           <a:p>
-            <a:pPr algn="ctr"/>
+            <a:pPr algn="ctr">
+              <a:lnSpc>
+                <a:spcPct val="100000"/>
+              </a:lnSpc>
+            </a:pPr>
             <a:r>
               <a:rPr b="0" lang="it-IT" sz="1200" spc="-1" strike="noStrike">
                 <a:solidFill>

</xml_diff>